<commit_message>
second pass of the day
</commit_message>
<xml_diff>
--- a/figures.pptx
+++ b/figures.pptx
@@ -13,6 +13,7 @@
     <p:sldId id="260" r:id="rId7"/>
     <p:sldId id="261" r:id="rId8"/>
     <p:sldId id="263" r:id="rId9"/>
+    <p:sldId id="266" r:id="rId10"/>
   </p:sldIdLst>
   <p:sldSz cx="9144000" cy="6858000" type="screen4x3"/>
   <p:notesSz cx="6858000" cy="9144000"/>
@@ -4313,6 +4314,198 @@
       </p:par>
     </p:tnLst>
   </p:timing>
+</p:sld>
+</file>
+
+<file path=ppt/slides/slide9.xml><?xml version="1.0" encoding="utf-8"?>
+<p:sld xmlns:a="http://schemas.openxmlformats.org/drawingml/2006/main" xmlns:r="http://schemas.openxmlformats.org/officeDocument/2006/relationships" xmlns:p="http://schemas.openxmlformats.org/presentationml/2006/main">
+  <p:cSld>
+    <p:spTree>
+      <p:nvGrpSpPr>
+        <p:cNvPr id="1" name=""/>
+        <p:cNvGrpSpPr/>
+        <p:nvPr/>
+      </p:nvGrpSpPr>
+      <p:grpSpPr>
+        <a:xfrm>
+          <a:off x="0" y="0"/>
+          <a:ext cx="0" cy="0"/>
+          <a:chOff x="0" y="0"/>
+          <a:chExt cx="0" cy="0"/>
+        </a:xfrm>
+      </p:grpSpPr>
+      <p:sp>
+        <p:nvSpPr>
+          <p:cNvPr id="4" name="Oval 3"/>
+          <p:cNvSpPr/>
+          <p:nvPr/>
+        </p:nvSpPr>
+        <p:spPr>
+          <a:xfrm>
+            <a:off x="4693708" y="4086454"/>
+            <a:ext cx="1534657" cy="1340728"/>
+          </a:xfrm>
+          <a:prstGeom prst="ellipse">
+            <a:avLst/>
+          </a:prstGeom>
+        </p:spPr>
+        <p:style>
+          <a:lnRef idx="2">
+            <a:schemeClr val="dk1"/>
+          </a:lnRef>
+          <a:fillRef idx="1">
+            <a:schemeClr val="lt1"/>
+          </a:fillRef>
+          <a:effectRef idx="0">
+            <a:schemeClr val="dk1"/>
+          </a:effectRef>
+          <a:fontRef idx="minor">
+            <a:schemeClr val="dk1"/>
+          </a:fontRef>
+        </p:style>
+        <p:txBody>
+          <a:bodyPr rtlCol="0" anchor="ctr"/>
+          <a:lstStyle/>
+          <a:p>
+            <a:pPr algn="ctr"/>
+            <a:endParaRPr lang="en-US"/>
+          </a:p>
+        </p:txBody>
+      </p:sp>
+      <p:sp>
+        <p:nvSpPr>
+          <p:cNvPr id="5" name="Right Arrow 4"/>
+          <p:cNvSpPr/>
+          <p:nvPr/>
+        </p:nvSpPr>
+        <p:spPr>
+          <a:xfrm rot="5400000">
+            <a:off x="5005068" y="3514365"/>
+            <a:ext cx="967522" cy="176657"/>
+          </a:xfrm>
+          <a:prstGeom prst="rightArrow">
+            <a:avLst/>
+          </a:prstGeom>
+        </p:spPr>
+        <p:style>
+          <a:lnRef idx="1">
+            <a:schemeClr val="dk1"/>
+          </a:lnRef>
+          <a:fillRef idx="3">
+            <a:schemeClr val="dk1"/>
+          </a:fillRef>
+          <a:effectRef idx="2">
+            <a:schemeClr val="dk1"/>
+          </a:effectRef>
+          <a:fontRef idx="minor">
+            <a:schemeClr val="lt1"/>
+          </a:fontRef>
+        </p:style>
+        <p:txBody>
+          <a:bodyPr rtlCol="0" anchor="ctr"/>
+          <a:lstStyle/>
+          <a:p>
+            <a:pPr algn="ctr"/>
+            <a:endParaRPr lang="en-US"/>
+          </a:p>
+        </p:txBody>
+      </p:sp>
+      <p:sp>
+        <p:nvSpPr>
+          <p:cNvPr id="6" name="Oval 5"/>
+          <p:cNvSpPr/>
+          <p:nvPr/>
+        </p:nvSpPr>
+        <p:spPr>
+          <a:xfrm>
+            <a:off x="4663498" y="1712715"/>
+            <a:ext cx="1534657" cy="1340728"/>
+          </a:xfrm>
+          <a:prstGeom prst="ellipse">
+            <a:avLst/>
+          </a:prstGeom>
+        </p:spPr>
+        <p:style>
+          <a:lnRef idx="2">
+            <a:schemeClr val="dk1"/>
+          </a:lnRef>
+          <a:fillRef idx="1">
+            <a:schemeClr val="lt1"/>
+          </a:fillRef>
+          <a:effectRef idx="0">
+            <a:schemeClr val="dk1"/>
+          </a:effectRef>
+          <a:fontRef idx="minor">
+            <a:schemeClr val="dk1"/>
+          </a:fontRef>
+        </p:style>
+        <p:txBody>
+          <a:bodyPr rtlCol="0" anchor="ctr"/>
+          <a:lstStyle/>
+          <a:p>
+            <a:pPr algn="ctr"/>
+            <a:endParaRPr lang="en-US"/>
+          </a:p>
+        </p:txBody>
+      </p:sp>
+      <p:pic>
+        <p:nvPicPr>
+          <p:cNvPr id="8" name="Picture 7"/>
+          <p:cNvPicPr>
+            <a:picLocks noChangeAspect="1"/>
+          </p:cNvPicPr>
+          <p:nvPr/>
+        </p:nvPicPr>
+        <p:blipFill>
+          <a:blip r:embed="rId2"/>
+          <a:stretch>
+            <a:fillRect/>
+          </a:stretch>
+        </p:blipFill>
+        <p:spPr>
+          <a:xfrm>
+            <a:off x="4741178" y="4500593"/>
+            <a:ext cx="1356655" cy="469900"/>
+          </a:xfrm>
+          <a:prstGeom prst="rect">
+            <a:avLst/>
+          </a:prstGeom>
+        </p:spPr>
+      </p:pic>
+      <p:pic>
+        <p:nvPicPr>
+          <p:cNvPr id="9" name="Picture 8"/>
+          <p:cNvPicPr>
+            <a:picLocks noChangeAspect="1"/>
+          </p:cNvPicPr>
+          <p:nvPr/>
+        </p:nvPicPr>
+        <p:blipFill>
+          <a:blip r:embed="rId3"/>
+          <a:stretch>
+            <a:fillRect/>
+          </a:stretch>
+        </p:blipFill>
+        <p:spPr>
+          <a:xfrm>
+            <a:off x="5180451" y="2048783"/>
+            <a:ext cx="440097" cy="691581"/>
+          </a:xfrm>
+          <a:prstGeom prst="rect">
+            <a:avLst/>
+          </a:prstGeom>
+        </p:spPr>
+      </p:pic>
+    </p:spTree>
+    <p:extLst>
+      <p:ext uri="{BB962C8B-B14F-4D97-AF65-F5344CB8AC3E}">
+        <p14:creationId xmlns:p14="http://schemas.microsoft.com/office/powerpoint/2010/main" val="2445036075"/>
+      </p:ext>
+    </p:extLst>
+  </p:cSld>
+  <p:clrMapOvr>
+    <a:masterClrMapping/>
+  </p:clrMapOvr>
 </p:sld>
 </file>
 

</xml_diff>

<commit_message>
changed up graphical, model and simplified computation
</commit_message>
<xml_diff>
--- a/figures.pptx
+++ b/figures.pptx
@@ -3577,14 +3577,14 @@
       </p:grpSpPr>
       <p:sp>
         <p:nvSpPr>
-          <p:cNvPr id="41" name="Oval 40"/>
+          <p:cNvPr id="48" name="Oval 47"/>
           <p:cNvSpPr/>
           <p:nvPr/>
         </p:nvSpPr>
         <p:spPr>
           <a:xfrm>
-            <a:off x="3079867" y="5037054"/>
-            <a:ext cx="1534657" cy="1340728"/>
+            <a:off x="3867702" y="182334"/>
+            <a:ext cx="1331800" cy="1226773"/>
           </a:xfrm>
           <a:prstGeom prst="ellipse">
             <a:avLst/>
@@ -3615,13 +3615,13 @@
       </p:sp>
       <p:sp>
         <p:nvSpPr>
-          <p:cNvPr id="4" name="Oval 3"/>
+          <p:cNvPr id="41" name="Oval 40"/>
           <p:cNvSpPr/>
           <p:nvPr/>
         </p:nvSpPr>
         <p:spPr>
           <a:xfrm>
-            <a:off x="4586539" y="427735"/>
+            <a:off x="2864735" y="5506954"/>
             <a:ext cx="1534657" cy="1340728"/>
           </a:xfrm>
           <a:prstGeom prst="ellipse">
@@ -3659,7 +3659,7 @@
         </p:nvSpPr>
         <p:spPr>
           <a:xfrm>
-            <a:off x="1347135" y="427735"/>
+            <a:off x="600777" y="2729960"/>
             <a:ext cx="1534657" cy="1340728"/>
           </a:xfrm>
           <a:prstGeom prst="ellipse">
@@ -3697,8 +3697,8 @@
         </p:nvSpPr>
         <p:spPr>
           <a:xfrm>
-            <a:off x="3006370" y="427735"/>
-            <a:ext cx="1534657" cy="1340728"/>
+            <a:off x="1940945" y="182336"/>
+            <a:ext cx="1331800" cy="1226773"/>
           </a:xfrm>
           <a:prstGeom prst="ellipse">
             <a:avLst/>
@@ -3735,8 +3735,8 @@
         </p:nvSpPr>
         <p:spPr>
           <a:xfrm>
-            <a:off x="3220173" y="880913"/>
-            <a:ext cx="1128943" cy="461665"/>
+            <a:off x="2143801" y="553841"/>
+            <a:ext cx="979715" cy="461665"/>
           </a:xfrm>
           <a:prstGeom prst="rect">
             <a:avLst/>
@@ -3751,7 +3751,11 @@
           <a:p>
             <a:r>
               <a:rPr lang="en-US" sz="2400" dirty="0" smtClean="0"/>
-              <a:t>  Pose</a:t>
+              <a:t> </a:t>
+            </a:r>
+            <a:r>
+              <a:rPr lang="en-US" sz="2400" dirty="0" smtClean="0"/>
+              <a:t>Pose</a:t>
             </a:r>
             <a:endParaRPr lang="en-US" dirty="0"/>
           </a:p>
@@ -3765,7 +3769,7 @@
         </p:nvSpPr>
         <p:spPr>
           <a:xfrm>
-            <a:off x="1521142" y="871025"/>
+            <a:off x="774784" y="3173250"/>
             <a:ext cx="1128943" cy="461665"/>
           </a:xfrm>
           <a:prstGeom prst="rect">
@@ -3802,8 +3806,8 @@
           <p:nvPr/>
         </p:nvSpPr>
         <p:spPr>
-          <a:xfrm rot="10800000">
-            <a:off x="4657251" y="5505293"/>
+          <a:xfrm rot="8771311">
+            <a:off x="4366727" y="5490180"/>
             <a:ext cx="967522" cy="176657"/>
           </a:xfrm>
           <a:prstGeom prst="rightArrow">
@@ -3835,44 +3839,14 @@
       </p:sp>
       <p:sp>
         <p:nvSpPr>
-          <p:cNvPr id="26" name="TextBox 25"/>
-          <p:cNvSpPr txBox="1"/>
-          <p:nvPr/>
-        </p:nvSpPr>
-        <p:spPr>
-          <a:xfrm>
-            <a:off x="4789396" y="860463"/>
-            <a:ext cx="1128943" cy="461665"/>
-          </a:xfrm>
-          <a:prstGeom prst="rect">
-            <a:avLst/>
-          </a:prstGeom>
-          <a:noFill/>
-        </p:spPr>
-        <p:txBody>
-          <a:bodyPr wrap="square" rtlCol="0">
-            <a:spAutoFit/>
-          </a:bodyPr>
-          <a:lstStyle/>
-          <a:p>
-            <a:r>
-              <a:rPr lang="en-US" sz="2400" dirty="0" smtClean="0"/>
-              <a:t>Motion</a:t>
-            </a:r>
-            <a:endParaRPr lang="en-US" dirty="0"/>
-          </a:p>
-        </p:txBody>
-      </p:sp>
-      <p:sp>
-        <p:nvSpPr>
           <p:cNvPr id="9" name="Rectangle 8"/>
           <p:cNvSpPr/>
           <p:nvPr/>
         </p:nvSpPr>
         <p:spPr>
-          <a:xfrm>
-            <a:off x="1910065" y="2566297"/>
-            <a:ext cx="3714708" cy="1819900"/>
+          <a:xfrm rot="5400000">
+            <a:off x="1961900" y="2587082"/>
+            <a:ext cx="3377423" cy="1626523"/>
           </a:xfrm>
           <a:prstGeom prst="rect">
             <a:avLst/>
@@ -3909,8 +3883,8 @@
         </p:nvSpPr>
         <p:spPr>
           <a:xfrm>
-            <a:off x="5177823" y="3891329"/>
-            <a:ext cx="484156" cy="461665"/>
+            <a:off x="4100891" y="4603594"/>
+            <a:ext cx="432711" cy="461665"/>
           </a:xfrm>
           <a:prstGeom prst="rect">
             <a:avLst/>
@@ -3937,14 +3911,44 @@
       </p:sp>
       <p:sp>
         <p:nvSpPr>
+          <p:cNvPr id="26" name="TextBox 25"/>
+          <p:cNvSpPr txBox="1"/>
+          <p:nvPr/>
+        </p:nvSpPr>
+        <p:spPr>
+          <a:xfrm>
+            <a:off x="3923312" y="561540"/>
+            <a:ext cx="1276190" cy="461665"/>
+          </a:xfrm>
+          <a:prstGeom prst="rect">
+            <a:avLst/>
+          </a:prstGeom>
+          <a:noFill/>
+        </p:spPr>
+        <p:txBody>
+          <a:bodyPr wrap="square" rtlCol="0">
+            <a:spAutoFit/>
+          </a:bodyPr>
+          <a:lstStyle/>
+          <a:p>
+            <a:r>
+              <a:rPr lang="en-US" sz="2400" dirty="0" smtClean="0"/>
+              <a:t> Motion</a:t>
+            </a:r>
+            <a:endParaRPr lang="en-US" dirty="0"/>
+          </a:p>
+        </p:txBody>
+      </p:sp>
+      <p:sp>
+        <p:nvSpPr>
           <p:cNvPr id="29" name="Oval 28"/>
           <p:cNvSpPr/>
           <p:nvPr/>
         </p:nvSpPr>
         <p:spPr>
           <a:xfrm>
-            <a:off x="2114464" y="2845747"/>
-            <a:ext cx="1534657" cy="1340728"/>
+            <a:off x="2929216" y="1833367"/>
+            <a:ext cx="1371589" cy="1218994"/>
           </a:xfrm>
           <a:prstGeom prst="ellipse">
             <a:avLst/>
@@ -3981,8 +3985,8 @@
         </p:nvSpPr>
         <p:spPr>
           <a:xfrm>
-            <a:off x="3885244" y="2845747"/>
-            <a:ext cx="1534657" cy="1340728"/>
+            <a:off x="2929216" y="3519643"/>
+            <a:ext cx="1371589" cy="1218994"/>
           </a:xfrm>
           <a:prstGeom prst="ellipse">
             <a:avLst/>
@@ -4027,8 +4031,8 @@
         </p:blipFill>
         <p:spPr>
           <a:xfrm>
-            <a:off x="2639826" y="3267636"/>
-            <a:ext cx="483934" cy="443606"/>
+            <a:off x="3358651" y="2265251"/>
+            <a:ext cx="439994" cy="403328"/>
           </a:xfrm>
           <a:prstGeom prst="rect">
             <a:avLst/>
@@ -4051,8 +4055,8 @@
         </p:blipFill>
         <p:spPr>
           <a:xfrm>
-            <a:off x="4351353" y="3267636"/>
-            <a:ext cx="625081" cy="443606"/>
+            <a:off x="3395326" y="3964562"/>
+            <a:ext cx="568326" cy="403328"/>
           </a:xfrm>
           <a:prstGeom prst="rect">
             <a:avLst/>
@@ -4067,7 +4071,7 @@
         </p:nvSpPr>
         <p:spPr>
           <a:xfrm>
-            <a:off x="5661979" y="4952290"/>
+            <a:off x="5199502" y="4166226"/>
             <a:ext cx="1534657" cy="1340728"/>
           </a:xfrm>
           <a:prstGeom prst="ellipse">
@@ -4113,7 +4117,7 @@
         </p:blipFill>
         <p:spPr>
           <a:xfrm>
-            <a:off x="6243704" y="5374179"/>
+            <a:off x="5781227" y="4588115"/>
             <a:ext cx="458847" cy="573559"/>
           </a:xfrm>
           <a:prstGeom prst="rect">
@@ -4128,9 +4132,9 @@
           <p:nvPr/>
         </p:nvSpPr>
         <p:spPr>
-          <a:xfrm rot="4529510">
-            <a:off x="1814534" y="2082506"/>
-            <a:ext cx="790830" cy="183486"/>
+          <a:xfrm rot="1989058">
+            <a:off x="2127378" y="3678402"/>
+            <a:ext cx="818262" cy="183486"/>
           </a:xfrm>
           <a:prstGeom prst="rightArrow">
             <a:avLst/>
@@ -4175,7 +4179,7 @@
         </p:blipFill>
         <p:spPr>
           <a:xfrm>
-            <a:off x="3127337" y="5451193"/>
+            <a:off x="2912205" y="5921093"/>
             <a:ext cx="1356655" cy="469900"/>
           </a:xfrm>
           <a:prstGeom prst="rect">
@@ -4190,9 +4194,9 @@
           <p:nvPr/>
         </p:nvSpPr>
         <p:spPr>
-          <a:xfrm rot="5400000" flipV="1">
-            <a:off x="3320907" y="2085638"/>
-            <a:ext cx="817436" cy="183086"/>
+          <a:xfrm rot="7206509" flipV="1">
+            <a:off x="3708378" y="1517700"/>
+            <a:ext cx="591715" cy="177475"/>
           </a:xfrm>
           <a:prstGeom prst="rightArrow">
             <a:avLst/>
@@ -4223,14 +4227,14 @@
       </p:sp>
       <p:sp>
         <p:nvSpPr>
-          <p:cNvPr id="40" name="Right Arrow 39"/>
+          <p:cNvPr id="19" name="Right Arrow 18"/>
           <p:cNvSpPr/>
           <p:nvPr/>
         </p:nvSpPr>
         <p:spPr>
-          <a:xfrm rot="6044522" flipV="1">
-            <a:off x="4743668" y="2086763"/>
-            <a:ext cx="879667" cy="181480"/>
+          <a:xfrm rot="5400000" flipV="1">
+            <a:off x="3471765" y="5254199"/>
+            <a:ext cx="325428" cy="180085"/>
           </a:xfrm>
           <a:prstGeom prst="rightArrow">
             <a:avLst/>
@@ -4261,14 +4265,90 @@
       </p:sp>
       <p:sp>
         <p:nvSpPr>
-          <p:cNvPr id="19" name="Right Arrow 18"/>
+          <p:cNvPr id="47" name="Right Arrow 46"/>
           <p:cNvSpPr/>
           <p:nvPr/>
         </p:nvSpPr>
         <p:spPr>
+          <a:xfrm rot="19266141">
+            <a:off x="2031778" y="2744355"/>
+            <a:ext cx="946501" cy="177952"/>
+          </a:xfrm>
+          <a:prstGeom prst="rightArrow">
+            <a:avLst/>
+          </a:prstGeom>
+        </p:spPr>
+        <p:style>
+          <a:lnRef idx="1">
+            <a:schemeClr val="dk1"/>
+          </a:lnRef>
+          <a:fillRef idx="3">
+            <a:schemeClr val="dk1"/>
+          </a:fillRef>
+          <a:effectRef idx="2">
+            <a:schemeClr val="dk1"/>
+          </a:effectRef>
+          <a:fontRef idx="minor">
+            <a:schemeClr val="lt1"/>
+          </a:fontRef>
+        </p:style>
+        <p:txBody>
+          <a:bodyPr rtlCol="0" anchor="ctr"/>
+          <a:lstStyle/>
+          <a:p>
+            <a:pPr algn="ctr"/>
+            <a:endParaRPr lang="en-US"/>
+          </a:p>
+        </p:txBody>
+      </p:sp>
+      <p:sp>
+        <p:nvSpPr>
+          <p:cNvPr id="49" name="Right Arrow 48"/>
+          <p:cNvSpPr/>
+          <p:nvPr/>
+        </p:nvSpPr>
+        <p:spPr>
           <a:xfrm rot="5400000" flipV="1">
-            <a:off x="3532316" y="4621583"/>
-            <a:ext cx="650857" cy="180085"/>
+            <a:off x="3402980" y="3199449"/>
+            <a:ext cx="458168" cy="175255"/>
+          </a:xfrm>
+          <a:prstGeom prst="rightArrow">
+            <a:avLst/>
+          </a:prstGeom>
+        </p:spPr>
+        <p:style>
+          <a:lnRef idx="1">
+            <a:schemeClr val="dk1"/>
+          </a:lnRef>
+          <a:fillRef idx="3">
+            <a:schemeClr val="dk1"/>
+          </a:fillRef>
+          <a:effectRef idx="2">
+            <a:schemeClr val="dk1"/>
+          </a:effectRef>
+          <a:fontRef idx="minor">
+            <a:schemeClr val="lt1"/>
+          </a:fontRef>
+        </p:style>
+        <p:txBody>
+          <a:bodyPr rtlCol="0" anchor="ctr"/>
+          <a:lstStyle/>
+          <a:p>
+            <a:pPr algn="ctr"/>
+            <a:endParaRPr lang="en-US"/>
+          </a:p>
+        </p:txBody>
+      </p:sp>
+      <p:sp>
+        <p:nvSpPr>
+          <p:cNvPr id="50" name="Right Arrow 49"/>
+          <p:cNvSpPr/>
+          <p:nvPr/>
+        </p:nvSpPr>
+        <p:spPr>
+          <a:xfrm rot="3411806" flipV="1">
+            <a:off x="2846424" y="1533320"/>
+            <a:ext cx="591715" cy="177475"/>
           </a:xfrm>
           <a:prstGeom prst="rightArrow">
             <a:avLst/>
@@ -4380,7 +4460,7 @@
         </p:nvSpPr>
         <p:spPr>
           <a:xfrm rot="5400000">
-            <a:off x="5005068" y="3514365"/>
+            <a:off x="4884330" y="3514366"/>
             <a:ext cx="967522" cy="176657"/>
           </a:xfrm>
           <a:prstGeom prst="rightArrow">

</xml_diff>

<commit_message>
Revised sections 1-5. Still needs a number of revisions, particularly in section 5.
</commit_message>
<xml_diff>
--- a/figures.pptx
+++ b/figures.pptx
@@ -4,6 +4,9 @@
   <p:sldMasterIdLst>
     <p:sldMasterId id="2147483648" r:id="rId1"/>
   </p:sldMasterIdLst>
+  <p:notesMasterIdLst>
+    <p:notesMasterId r:id="rId12"/>
+  </p:notesMasterIdLst>
   <p:sldIdLst>
     <p:sldId id="264" r:id="rId2"/>
     <p:sldId id="265" r:id="rId3"/>
@@ -14,6 +17,7 @@
     <p:sldId id="261" r:id="rId8"/>
     <p:sldId id="263" r:id="rId9"/>
     <p:sldId id="266" r:id="rId10"/>
+    <p:sldId id="267" r:id="rId11"/>
   </p:sldIdLst>
   <p:sldSz cx="9144000" cy="6858000" type="screen4x3"/>
   <p:notesSz cx="6858000" cy="9144000"/>
@@ -115,6 +119,444 @@
 </p:presentation>
 </file>
 
+<file path=ppt/notesMasters/notesMaster1.xml><?xml version="1.0" encoding="utf-8"?>
+<p:notesMaster xmlns:a="http://schemas.openxmlformats.org/drawingml/2006/main" xmlns:r="http://schemas.openxmlformats.org/officeDocument/2006/relationships" xmlns:p="http://schemas.openxmlformats.org/presentationml/2006/main">
+  <p:cSld>
+    <p:bg>
+      <p:bgRef idx="1001">
+        <a:schemeClr val="bg1"/>
+      </p:bgRef>
+    </p:bg>
+    <p:spTree>
+      <p:nvGrpSpPr>
+        <p:cNvPr id="1" name=""/>
+        <p:cNvGrpSpPr/>
+        <p:nvPr/>
+      </p:nvGrpSpPr>
+      <p:grpSpPr>
+        <a:xfrm>
+          <a:off x="0" y="0"/>
+          <a:ext cx="0" cy="0"/>
+          <a:chOff x="0" y="0"/>
+          <a:chExt cx="0" cy="0"/>
+        </a:xfrm>
+      </p:grpSpPr>
+      <p:sp>
+        <p:nvSpPr>
+          <p:cNvPr id="2" name="Header Placeholder 1"/>
+          <p:cNvSpPr>
+            <a:spLocks noGrp="1"/>
+          </p:cNvSpPr>
+          <p:nvPr>
+            <p:ph type="hdr" sz="quarter"/>
+          </p:nvPr>
+        </p:nvSpPr>
+        <p:spPr>
+          <a:xfrm>
+            <a:off x="0" y="0"/>
+            <a:ext cx="2971800" cy="457200"/>
+          </a:xfrm>
+          <a:prstGeom prst="rect">
+            <a:avLst/>
+          </a:prstGeom>
+        </p:spPr>
+        <p:txBody>
+          <a:bodyPr vert="horz" lIns="91440" tIns="45720" rIns="91440" bIns="45720" rtlCol="0"/>
+          <a:lstStyle>
+            <a:lvl1pPr algn="l">
+              <a:defRPr sz="1200"/>
+            </a:lvl1pPr>
+          </a:lstStyle>
+          <a:p>
+            <a:endParaRPr lang="en-US"/>
+          </a:p>
+        </p:txBody>
+      </p:sp>
+      <p:sp>
+        <p:nvSpPr>
+          <p:cNvPr id="3" name="Date Placeholder 2"/>
+          <p:cNvSpPr>
+            <a:spLocks noGrp="1"/>
+          </p:cNvSpPr>
+          <p:nvPr>
+            <p:ph type="dt" idx="1"/>
+          </p:nvPr>
+        </p:nvSpPr>
+        <p:spPr>
+          <a:xfrm>
+            <a:off x="3884613" y="0"/>
+            <a:ext cx="2971800" cy="457200"/>
+          </a:xfrm>
+          <a:prstGeom prst="rect">
+            <a:avLst/>
+          </a:prstGeom>
+        </p:spPr>
+        <p:txBody>
+          <a:bodyPr vert="horz" lIns="91440" tIns="45720" rIns="91440" bIns="45720" rtlCol="0"/>
+          <a:lstStyle>
+            <a:lvl1pPr algn="r">
+              <a:defRPr sz="1200"/>
+            </a:lvl1pPr>
+          </a:lstStyle>
+          <a:p>
+            <a:fld id="{21EB0F01-5E20-0043-8930-939DDC118492}" type="datetimeFigureOut">
+              <a:rPr lang="en-US" smtClean="0"/>
+              <a:t>1/9/15</a:t>
+            </a:fld>
+            <a:endParaRPr lang="en-US"/>
+          </a:p>
+        </p:txBody>
+      </p:sp>
+      <p:sp>
+        <p:nvSpPr>
+          <p:cNvPr id="4" name="Slide Image Placeholder 3"/>
+          <p:cNvSpPr>
+            <a:spLocks noGrp="1" noRot="1" noChangeAspect="1"/>
+          </p:cNvSpPr>
+          <p:nvPr>
+            <p:ph type="sldImg" idx="2"/>
+          </p:nvPr>
+        </p:nvSpPr>
+        <p:spPr>
+          <a:xfrm>
+            <a:off x="1143000" y="685800"/>
+            <a:ext cx="4572000" cy="3429000"/>
+          </a:xfrm>
+          <a:prstGeom prst="rect">
+            <a:avLst/>
+          </a:prstGeom>
+          <a:noFill/>
+          <a:ln w="12700">
+            <a:solidFill>
+              <a:prstClr val="black"/>
+            </a:solidFill>
+          </a:ln>
+        </p:spPr>
+        <p:txBody>
+          <a:bodyPr vert="horz" lIns="91440" tIns="45720" rIns="91440" bIns="45720" rtlCol="0" anchor="ctr"/>
+          <a:lstStyle/>
+          <a:p>
+            <a:endParaRPr lang="en-US"/>
+          </a:p>
+        </p:txBody>
+      </p:sp>
+      <p:sp>
+        <p:nvSpPr>
+          <p:cNvPr id="5" name="Notes Placeholder 4"/>
+          <p:cNvSpPr>
+            <a:spLocks noGrp="1"/>
+          </p:cNvSpPr>
+          <p:nvPr>
+            <p:ph type="body" sz="quarter" idx="3"/>
+          </p:nvPr>
+        </p:nvSpPr>
+        <p:spPr>
+          <a:xfrm>
+            <a:off x="685800" y="4343400"/>
+            <a:ext cx="5486400" cy="4114800"/>
+          </a:xfrm>
+          <a:prstGeom prst="rect">
+            <a:avLst/>
+          </a:prstGeom>
+        </p:spPr>
+        <p:txBody>
+          <a:bodyPr vert="horz" lIns="91440" tIns="45720" rIns="91440" bIns="45720" rtlCol="0"/>
+          <a:lstStyle/>
+          <a:p>
+            <a:pPr lvl="0"/>
+            <a:r>
+              <a:rPr lang="en-US" smtClean="0"/>
+              <a:t>Click to edit Master text styles</a:t>
+            </a:r>
+          </a:p>
+          <a:p>
+            <a:pPr lvl="1"/>
+            <a:r>
+              <a:rPr lang="en-US" smtClean="0"/>
+              <a:t>Second level</a:t>
+            </a:r>
+          </a:p>
+          <a:p>
+            <a:pPr lvl="2"/>
+            <a:r>
+              <a:rPr lang="en-US" smtClean="0"/>
+              <a:t>Third level</a:t>
+            </a:r>
+          </a:p>
+          <a:p>
+            <a:pPr lvl="3"/>
+            <a:r>
+              <a:rPr lang="en-US" smtClean="0"/>
+              <a:t>Fourth level</a:t>
+            </a:r>
+          </a:p>
+          <a:p>
+            <a:pPr lvl="4"/>
+            <a:r>
+              <a:rPr lang="en-US" smtClean="0"/>
+              <a:t>Fifth level</a:t>
+            </a:r>
+            <a:endParaRPr lang="en-US"/>
+          </a:p>
+        </p:txBody>
+      </p:sp>
+      <p:sp>
+        <p:nvSpPr>
+          <p:cNvPr id="6" name="Footer Placeholder 5"/>
+          <p:cNvSpPr>
+            <a:spLocks noGrp="1"/>
+          </p:cNvSpPr>
+          <p:nvPr>
+            <p:ph type="ftr" sz="quarter" idx="4"/>
+          </p:nvPr>
+        </p:nvSpPr>
+        <p:spPr>
+          <a:xfrm>
+            <a:off x="0" y="8685213"/>
+            <a:ext cx="2971800" cy="457200"/>
+          </a:xfrm>
+          <a:prstGeom prst="rect">
+            <a:avLst/>
+          </a:prstGeom>
+        </p:spPr>
+        <p:txBody>
+          <a:bodyPr vert="horz" lIns="91440" tIns="45720" rIns="91440" bIns="45720" rtlCol="0" anchor="b"/>
+          <a:lstStyle>
+            <a:lvl1pPr algn="l">
+              <a:defRPr sz="1200"/>
+            </a:lvl1pPr>
+          </a:lstStyle>
+          <a:p>
+            <a:endParaRPr lang="en-US"/>
+          </a:p>
+        </p:txBody>
+      </p:sp>
+      <p:sp>
+        <p:nvSpPr>
+          <p:cNvPr id="7" name="Slide Number Placeholder 6"/>
+          <p:cNvSpPr>
+            <a:spLocks noGrp="1"/>
+          </p:cNvSpPr>
+          <p:nvPr>
+            <p:ph type="sldNum" sz="quarter" idx="5"/>
+          </p:nvPr>
+        </p:nvSpPr>
+        <p:spPr>
+          <a:xfrm>
+            <a:off x="3884613" y="8685213"/>
+            <a:ext cx="2971800" cy="457200"/>
+          </a:xfrm>
+          <a:prstGeom prst="rect">
+            <a:avLst/>
+          </a:prstGeom>
+        </p:spPr>
+        <p:txBody>
+          <a:bodyPr vert="horz" lIns="91440" tIns="45720" rIns="91440" bIns="45720" rtlCol="0" anchor="b"/>
+          <a:lstStyle>
+            <a:lvl1pPr algn="r">
+              <a:defRPr sz="1200"/>
+            </a:lvl1pPr>
+          </a:lstStyle>
+          <a:p>
+            <a:fld id="{DBDB2EA8-2BA0-D94F-BDD6-F90720892880}" type="slidenum">
+              <a:rPr lang="en-US" smtClean="0"/>
+              <a:t>‹#›</a:t>
+            </a:fld>
+            <a:endParaRPr lang="en-US"/>
+          </a:p>
+        </p:txBody>
+      </p:sp>
+    </p:spTree>
+    <p:extLst>
+      <p:ext uri="{BB962C8B-B14F-4D97-AF65-F5344CB8AC3E}">
+        <p14:creationId xmlns:p14="http://schemas.microsoft.com/office/powerpoint/2010/main" val="851129081"/>
+      </p:ext>
+    </p:extLst>
+  </p:cSld>
+  <p:clrMap bg1="lt1" tx1="dk1" bg2="lt2" tx2="dk2" accent1="accent1" accent2="accent2" accent3="accent3" accent4="accent4" accent5="accent5" accent6="accent6" hlink="hlink" folHlink="folHlink"/>
+  <p:notesStyle>
+    <a:lvl1pPr marL="0" algn="l" defTabSz="457200" rtl="0" eaLnBrk="1" latinLnBrk="0" hangingPunct="1">
+      <a:defRPr sz="1200" kern="1200">
+        <a:solidFill>
+          <a:schemeClr val="tx1"/>
+        </a:solidFill>
+        <a:latin typeface="+mn-lt"/>
+        <a:ea typeface="+mn-ea"/>
+        <a:cs typeface="+mn-cs"/>
+      </a:defRPr>
+    </a:lvl1pPr>
+    <a:lvl2pPr marL="457200" algn="l" defTabSz="457200" rtl="0" eaLnBrk="1" latinLnBrk="0" hangingPunct="1">
+      <a:defRPr sz="1200" kern="1200">
+        <a:solidFill>
+          <a:schemeClr val="tx1"/>
+        </a:solidFill>
+        <a:latin typeface="+mn-lt"/>
+        <a:ea typeface="+mn-ea"/>
+        <a:cs typeface="+mn-cs"/>
+      </a:defRPr>
+    </a:lvl2pPr>
+    <a:lvl3pPr marL="914400" algn="l" defTabSz="457200" rtl="0" eaLnBrk="1" latinLnBrk="0" hangingPunct="1">
+      <a:defRPr sz="1200" kern="1200">
+        <a:solidFill>
+          <a:schemeClr val="tx1"/>
+        </a:solidFill>
+        <a:latin typeface="+mn-lt"/>
+        <a:ea typeface="+mn-ea"/>
+        <a:cs typeface="+mn-cs"/>
+      </a:defRPr>
+    </a:lvl3pPr>
+    <a:lvl4pPr marL="1371600" algn="l" defTabSz="457200" rtl="0" eaLnBrk="1" latinLnBrk="0" hangingPunct="1">
+      <a:defRPr sz="1200" kern="1200">
+        <a:solidFill>
+          <a:schemeClr val="tx1"/>
+        </a:solidFill>
+        <a:latin typeface="+mn-lt"/>
+        <a:ea typeface="+mn-ea"/>
+        <a:cs typeface="+mn-cs"/>
+      </a:defRPr>
+    </a:lvl4pPr>
+    <a:lvl5pPr marL="1828800" algn="l" defTabSz="457200" rtl="0" eaLnBrk="1" latinLnBrk="0" hangingPunct="1">
+      <a:defRPr sz="1200" kern="1200">
+        <a:solidFill>
+          <a:schemeClr val="tx1"/>
+        </a:solidFill>
+        <a:latin typeface="+mn-lt"/>
+        <a:ea typeface="+mn-ea"/>
+        <a:cs typeface="+mn-cs"/>
+      </a:defRPr>
+    </a:lvl5pPr>
+    <a:lvl6pPr marL="2286000" algn="l" defTabSz="457200" rtl="0" eaLnBrk="1" latinLnBrk="0" hangingPunct="1">
+      <a:defRPr sz="1200" kern="1200">
+        <a:solidFill>
+          <a:schemeClr val="tx1"/>
+        </a:solidFill>
+        <a:latin typeface="+mn-lt"/>
+        <a:ea typeface="+mn-ea"/>
+        <a:cs typeface="+mn-cs"/>
+      </a:defRPr>
+    </a:lvl6pPr>
+    <a:lvl7pPr marL="2743200" algn="l" defTabSz="457200" rtl="0" eaLnBrk="1" latinLnBrk="0" hangingPunct="1">
+      <a:defRPr sz="1200" kern="1200">
+        <a:solidFill>
+          <a:schemeClr val="tx1"/>
+        </a:solidFill>
+        <a:latin typeface="+mn-lt"/>
+        <a:ea typeface="+mn-ea"/>
+        <a:cs typeface="+mn-cs"/>
+      </a:defRPr>
+    </a:lvl7pPr>
+    <a:lvl8pPr marL="3200400" algn="l" defTabSz="457200" rtl="0" eaLnBrk="1" latinLnBrk="0" hangingPunct="1">
+      <a:defRPr sz="1200" kern="1200">
+        <a:solidFill>
+          <a:schemeClr val="tx1"/>
+        </a:solidFill>
+        <a:latin typeface="+mn-lt"/>
+        <a:ea typeface="+mn-ea"/>
+        <a:cs typeface="+mn-cs"/>
+      </a:defRPr>
+    </a:lvl8pPr>
+    <a:lvl9pPr marL="3657600" algn="l" defTabSz="457200" rtl="0" eaLnBrk="1" latinLnBrk="0" hangingPunct="1">
+      <a:defRPr sz="1200" kern="1200">
+        <a:solidFill>
+          <a:schemeClr val="tx1"/>
+        </a:solidFill>
+        <a:latin typeface="+mn-lt"/>
+        <a:ea typeface="+mn-ea"/>
+        <a:cs typeface="+mn-cs"/>
+      </a:defRPr>
+    </a:lvl9pPr>
+  </p:notesStyle>
+</p:notesMaster>
+</file>
+
+<file path=ppt/notesSlides/notesSlide1.xml><?xml version="1.0" encoding="utf-8"?>
+<p:notes xmlns:a="http://schemas.openxmlformats.org/drawingml/2006/main" xmlns:r="http://schemas.openxmlformats.org/officeDocument/2006/relationships" xmlns:p="http://schemas.openxmlformats.org/presentationml/2006/main">
+  <p:cSld>
+    <p:spTree>
+      <p:nvGrpSpPr>
+        <p:cNvPr id="1" name=""/>
+        <p:cNvGrpSpPr/>
+        <p:nvPr/>
+      </p:nvGrpSpPr>
+      <p:grpSpPr>
+        <a:xfrm>
+          <a:off x="0" y="0"/>
+          <a:ext cx="0" cy="0"/>
+          <a:chOff x="0" y="0"/>
+          <a:chExt cx="0" cy="0"/>
+        </a:xfrm>
+      </p:grpSpPr>
+      <p:sp>
+        <p:nvSpPr>
+          <p:cNvPr id="2" name="Slide Image Placeholder 1"/>
+          <p:cNvSpPr>
+            <a:spLocks noGrp="1" noRot="1" noChangeAspect="1"/>
+          </p:cNvSpPr>
+          <p:nvPr>
+            <p:ph type="sldImg"/>
+          </p:nvPr>
+        </p:nvSpPr>
+        <p:spPr/>
+      </p:sp>
+      <p:sp>
+        <p:nvSpPr>
+          <p:cNvPr id="3" name="Notes Placeholder 2"/>
+          <p:cNvSpPr>
+            <a:spLocks noGrp="1"/>
+          </p:cNvSpPr>
+          <p:nvPr>
+            <p:ph type="body" idx="1"/>
+          </p:nvPr>
+        </p:nvSpPr>
+        <p:spPr/>
+        <p:txBody>
+          <a:bodyPr/>
+          <a:lstStyle/>
+          <a:p>
+            <a:r>
+              <a:rPr lang="en-US" dirty="0" smtClean="0"/>
+              <a:t>Grasp illustration</a:t>
+            </a:r>
+            <a:endParaRPr lang="en-US" dirty="0"/>
+          </a:p>
+        </p:txBody>
+      </p:sp>
+      <p:sp>
+        <p:nvSpPr>
+          <p:cNvPr id="4" name="Slide Number Placeholder 3"/>
+          <p:cNvSpPr>
+            <a:spLocks noGrp="1"/>
+          </p:cNvSpPr>
+          <p:nvPr>
+            <p:ph type="sldNum" sz="quarter" idx="10"/>
+          </p:nvPr>
+        </p:nvSpPr>
+        <p:spPr/>
+        <p:txBody>
+          <a:bodyPr/>
+          <a:lstStyle/>
+          <a:p>
+            <a:fld id="{C5771C86-A517-F54C-BE81-890F1891BAD5}" type="slidenum">
+              <a:rPr lang="en-US" smtClean="0"/>
+              <a:t>10</a:t>
+            </a:fld>
+            <a:endParaRPr lang="en-US"/>
+          </a:p>
+        </p:txBody>
+      </p:sp>
+    </p:spTree>
+    <p:extLst>
+      <p:ext uri="{BB962C8B-B14F-4D97-AF65-F5344CB8AC3E}">
+        <p14:creationId xmlns:p14="http://schemas.microsoft.com/office/powerpoint/2010/main" val="3868757133"/>
+      </p:ext>
+    </p:extLst>
+  </p:cSld>
+  <p:clrMapOvr>
+    <a:masterClrMapping/>
+  </p:clrMapOvr>
+</p:notes>
+</file>
+
 <file path=ppt/slideLayouts/slideLayout1.xml><?xml version="1.0" encoding="utf-8"?>
 <p:sldLayout xmlns:a="http://schemas.openxmlformats.org/drawingml/2006/main" xmlns:r="http://schemas.openxmlformats.org/officeDocument/2006/relationships" xmlns:p="http://schemas.openxmlformats.org/presentationml/2006/main" type="title" preserve="1">
   <p:cSld name="Title Slide">
@@ -296,7 +738,7 @@
           <a:p>
             <a:fld id="{F382D2B8-5B0C-E947-8C66-90157F7E06E9}" type="datetimeFigureOut">
               <a:rPr lang="en-US" smtClean="0"/>
-              <a:t>12/12/14</a:t>
+              <a:t>1/9/15</a:t>
             </a:fld>
             <a:endParaRPr lang="en-US"/>
           </a:p>
@@ -466,7 +908,7 @@
           <a:p>
             <a:fld id="{F382D2B8-5B0C-E947-8C66-90157F7E06E9}" type="datetimeFigureOut">
               <a:rPr lang="en-US" smtClean="0"/>
-              <a:t>12/12/14</a:t>
+              <a:t>1/9/15</a:t>
             </a:fld>
             <a:endParaRPr lang="en-US"/>
           </a:p>
@@ -646,7 +1088,7 @@
           <a:p>
             <a:fld id="{F382D2B8-5B0C-E947-8C66-90157F7E06E9}" type="datetimeFigureOut">
               <a:rPr lang="en-US" smtClean="0"/>
-              <a:t>12/12/14</a:t>
+              <a:t>1/9/15</a:t>
             </a:fld>
             <a:endParaRPr lang="en-US"/>
           </a:p>
@@ -816,7 +1258,7 @@
           <a:p>
             <a:fld id="{F382D2B8-5B0C-E947-8C66-90157F7E06E9}" type="datetimeFigureOut">
               <a:rPr lang="en-US" smtClean="0"/>
-              <a:t>12/12/14</a:t>
+              <a:t>1/9/15</a:t>
             </a:fld>
             <a:endParaRPr lang="en-US"/>
           </a:p>
@@ -1062,7 +1504,7 @@
           <a:p>
             <a:fld id="{F382D2B8-5B0C-E947-8C66-90157F7E06E9}" type="datetimeFigureOut">
               <a:rPr lang="en-US" smtClean="0"/>
-              <a:t>12/12/14</a:t>
+              <a:t>1/9/15</a:t>
             </a:fld>
             <a:endParaRPr lang="en-US"/>
           </a:p>
@@ -1350,7 +1792,7 @@
           <a:p>
             <a:fld id="{F382D2B8-5B0C-E947-8C66-90157F7E06E9}" type="datetimeFigureOut">
               <a:rPr lang="en-US" smtClean="0"/>
-              <a:t>12/12/14</a:t>
+              <a:t>1/9/15</a:t>
             </a:fld>
             <a:endParaRPr lang="en-US"/>
           </a:p>
@@ -1772,7 +2214,7 @@
           <a:p>
             <a:fld id="{F382D2B8-5B0C-E947-8C66-90157F7E06E9}" type="datetimeFigureOut">
               <a:rPr lang="en-US" smtClean="0"/>
-              <a:t>12/12/14</a:t>
+              <a:t>1/9/15</a:t>
             </a:fld>
             <a:endParaRPr lang="en-US"/>
           </a:p>
@@ -1890,7 +2332,7 @@
           <a:p>
             <a:fld id="{F382D2B8-5B0C-E947-8C66-90157F7E06E9}" type="datetimeFigureOut">
               <a:rPr lang="en-US" smtClean="0"/>
-              <a:t>12/12/14</a:t>
+              <a:t>1/9/15</a:t>
             </a:fld>
             <a:endParaRPr lang="en-US"/>
           </a:p>
@@ -1985,7 +2427,7 @@
           <a:p>
             <a:fld id="{F382D2B8-5B0C-E947-8C66-90157F7E06E9}" type="datetimeFigureOut">
               <a:rPr lang="en-US" smtClean="0"/>
-              <a:t>12/12/14</a:t>
+              <a:t>1/9/15</a:t>
             </a:fld>
             <a:endParaRPr lang="en-US"/>
           </a:p>
@@ -2262,7 +2704,7 @@
           <a:p>
             <a:fld id="{F382D2B8-5B0C-E947-8C66-90157F7E06E9}" type="datetimeFigureOut">
               <a:rPr lang="en-US" smtClean="0"/>
-              <a:t>12/12/14</a:t>
+              <a:t>1/9/15</a:t>
             </a:fld>
             <a:endParaRPr lang="en-US"/>
           </a:p>
@@ -2515,7 +2957,7 @@
           <a:p>
             <a:fld id="{F382D2B8-5B0C-E947-8C66-90157F7E06E9}" type="datetimeFigureOut">
               <a:rPr lang="en-US" smtClean="0"/>
-              <a:t>12/12/14</a:t>
+              <a:t>1/9/15</a:t>
             </a:fld>
             <a:endParaRPr lang="en-US"/>
           </a:p>
@@ -2728,7 +3170,7 @@
           <a:p>
             <a:fld id="{F382D2B8-5B0C-E947-8C66-90157F7E06E9}" type="datetimeFigureOut">
               <a:rPr lang="en-US" smtClean="0"/>
-              <a:t>12/12/14</a:t>
+              <a:t>1/9/15</a:t>
             </a:fld>
             <a:endParaRPr lang="en-US"/>
           </a:p>
@@ -3146,6 +3588,1044 @@
 </p:sld>
 </file>
 
+<file path=ppt/slides/slide10.xml><?xml version="1.0" encoding="utf-8"?>
+<p:sld xmlns:a="http://schemas.openxmlformats.org/drawingml/2006/main" xmlns:r="http://schemas.openxmlformats.org/officeDocument/2006/relationships" xmlns:p="http://schemas.openxmlformats.org/presentationml/2006/main">
+  <p:cSld>
+    <p:spTree>
+      <p:nvGrpSpPr>
+        <p:cNvPr id="1" name=""/>
+        <p:cNvGrpSpPr/>
+        <p:nvPr/>
+      </p:nvGrpSpPr>
+      <p:grpSpPr>
+        <a:xfrm>
+          <a:off x="0" y="0"/>
+          <a:ext cx="0" cy="0"/>
+          <a:chOff x="0" y="0"/>
+          <a:chExt cx="0" cy="0"/>
+        </a:xfrm>
+      </p:grpSpPr>
+      <p:pic>
+        <p:nvPicPr>
+          <p:cNvPr id="155" name="Picture 154" descr="marker_gpis.eps"/>
+          <p:cNvPicPr>
+            <a:picLocks noChangeAspect="1"/>
+          </p:cNvPicPr>
+          <p:nvPr/>
+        </p:nvPicPr>
+        <p:blipFill rotWithShape="1">
+          <a:blip r:embed="rId3">
+            <a:extLst>
+              <a:ext uri="{28A0092B-C50C-407E-A947-70E740481C1C}">
+                <a14:useLocalDpi xmlns:a14="http://schemas.microsoft.com/office/drawing/2010/main" val="0"/>
+              </a:ext>
+            </a:extLst>
+          </a:blip>
+          <a:srcRect l="25356" t="23302" r="28333" b="35948"/>
+          <a:stretch/>
+        </p:blipFill>
+        <p:spPr>
+          <a:xfrm>
+            <a:off x="1981760" y="2346274"/>
+            <a:ext cx="5214149" cy="2175223"/>
+          </a:xfrm>
+          <a:prstGeom prst="rect">
+            <a:avLst/>
+          </a:prstGeom>
+        </p:spPr>
+      </p:pic>
+      <p:grpSp>
+        <p:nvGrpSpPr>
+          <p:cNvPr id="55" name="Group 54"/>
+          <p:cNvGrpSpPr/>
+          <p:nvPr/>
+        </p:nvGrpSpPr>
+        <p:grpSpPr>
+          <a:xfrm rot="20850777">
+            <a:off x="4769891" y="5345989"/>
+            <a:ext cx="954145" cy="972822"/>
+            <a:chOff x="3945259" y="5393221"/>
+            <a:chExt cx="954145" cy="972822"/>
+          </a:xfrm>
+        </p:grpSpPr>
+        <p:cxnSp>
+          <p:nvCxnSpPr>
+            <p:cNvPr id="15" name="Straight Arrow Connector 14"/>
+            <p:cNvCxnSpPr/>
+            <p:nvPr/>
+          </p:nvCxnSpPr>
+          <p:spPr>
+            <a:xfrm flipH="1" flipV="1">
+              <a:off x="4431747" y="5545436"/>
+              <a:ext cx="98430" cy="820607"/>
+            </a:xfrm>
+            <a:prstGeom prst="straightConnector1">
+              <a:avLst/>
+            </a:prstGeom>
+            <a:ln w="50800">
+              <a:solidFill>
+                <a:srgbClr val="FF0000"/>
+              </a:solidFill>
+              <a:tailEnd type="triangle" w="lg" len="lg"/>
+            </a:ln>
+            <a:effectLst/>
+          </p:spPr>
+          <p:style>
+            <a:lnRef idx="2">
+              <a:schemeClr val="accent1"/>
+            </a:lnRef>
+            <a:fillRef idx="0">
+              <a:schemeClr val="accent1"/>
+            </a:fillRef>
+            <a:effectRef idx="1">
+              <a:schemeClr val="accent1"/>
+            </a:effectRef>
+            <a:fontRef idx="minor">
+              <a:schemeClr val="tx1"/>
+            </a:fontRef>
+          </p:style>
+        </p:cxnSp>
+        <p:cxnSp>
+          <p:nvCxnSpPr>
+            <p:cNvPr id="35" name="Straight Connector 34"/>
+            <p:cNvCxnSpPr/>
+            <p:nvPr/>
+          </p:nvCxnSpPr>
+          <p:spPr>
+            <a:xfrm rot="749223" flipV="1">
+              <a:off x="3945259" y="5393221"/>
+              <a:ext cx="954145" cy="337832"/>
+            </a:xfrm>
+            <a:prstGeom prst="line">
+              <a:avLst/>
+            </a:prstGeom>
+            <a:ln w="50800">
+              <a:solidFill>
+                <a:srgbClr val="FF0000"/>
+              </a:solidFill>
+            </a:ln>
+            <a:effectLst/>
+          </p:spPr>
+          <p:style>
+            <a:lnRef idx="2">
+              <a:schemeClr val="accent1"/>
+            </a:lnRef>
+            <a:fillRef idx="0">
+              <a:schemeClr val="accent1"/>
+            </a:fillRef>
+            <a:effectRef idx="1">
+              <a:schemeClr val="accent1"/>
+            </a:effectRef>
+            <a:fontRef idx="minor">
+              <a:schemeClr val="tx1"/>
+            </a:fontRef>
+          </p:style>
+        </p:cxnSp>
+      </p:grpSp>
+      <p:grpSp>
+        <p:nvGrpSpPr>
+          <p:cNvPr id="53" name="Group 52"/>
+          <p:cNvGrpSpPr/>
+          <p:nvPr/>
+        </p:nvGrpSpPr>
+        <p:grpSpPr>
+          <a:xfrm rot="20755560">
+            <a:off x="3210526" y="665387"/>
+            <a:ext cx="929504" cy="881648"/>
+            <a:chOff x="3735372" y="2226547"/>
+            <a:chExt cx="929504" cy="881648"/>
+          </a:xfrm>
+        </p:grpSpPr>
+        <p:cxnSp>
+          <p:nvCxnSpPr>
+            <p:cNvPr id="12" name="Straight Arrow Connector 11"/>
+            <p:cNvCxnSpPr/>
+            <p:nvPr/>
+          </p:nvCxnSpPr>
+          <p:spPr>
+            <a:xfrm>
+              <a:off x="4123244" y="2226547"/>
+              <a:ext cx="69640" cy="721276"/>
+            </a:xfrm>
+            <a:prstGeom prst="straightConnector1">
+              <a:avLst/>
+            </a:prstGeom>
+            <a:ln w="50800">
+              <a:solidFill>
+                <a:srgbClr val="FF0000"/>
+              </a:solidFill>
+              <a:tailEnd type="triangle" w="lg" len="lg"/>
+            </a:ln>
+            <a:effectLst/>
+          </p:spPr>
+          <p:style>
+            <a:lnRef idx="2">
+              <a:schemeClr val="accent1"/>
+            </a:lnRef>
+            <a:fillRef idx="0">
+              <a:schemeClr val="accent1"/>
+            </a:fillRef>
+            <a:effectRef idx="1">
+              <a:schemeClr val="accent1"/>
+            </a:effectRef>
+            <a:fontRef idx="minor">
+              <a:schemeClr val="tx1"/>
+            </a:fontRef>
+          </p:style>
+        </p:cxnSp>
+        <p:cxnSp>
+          <p:nvCxnSpPr>
+            <p:cNvPr id="24" name="Straight Connector 23"/>
+            <p:cNvCxnSpPr/>
+            <p:nvPr/>
+          </p:nvCxnSpPr>
+          <p:spPr>
+            <a:xfrm rot="844440" flipV="1">
+              <a:off x="3735372" y="2789866"/>
+              <a:ext cx="929504" cy="318329"/>
+            </a:xfrm>
+            <a:prstGeom prst="line">
+              <a:avLst/>
+            </a:prstGeom>
+            <a:ln w="50800">
+              <a:solidFill>
+                <a:srgbClr val="FF0000"/>
+              </a:solidFill>
+            </a:ln>
+            <a:effectLst/>
+          </p:spPr>
+          <p:style>
+            <a:lnRef idx="2">
+              <a:schemeClr val="accent1"/>
+            </a:lnRef>
+            <a:fillRef idx="0">
+              <a:schemeClr val="accent1"/>
+            </a:fillRef>
+            <a:effectRef idx="1">
+              <a:schemeClr val="accent1"/>
+            </a:effectRef>
+            <a:fontRef idx="minor">
+              <a:schemeClr val="tx1"/>
+            </a:fontRef>
+          </p:style>
+        </p:cxnSp>
+      </p:grpSp>
+      <p:sp>
+        <p:nvSpPr>
+          <p:cNvPr id="51" name="Plus 50"/>
+          <p:cNvSpPr/>
+          <p:nvPr/>
+        </p:nvSpPr>
+        <p:spPr>
+          <a:xfrm>
+            <a:off x="4578110" y="3272247"/>
+            <a:ext cx="382588" cy="361936"/>
+          </a:xfrm>
+          <a:prstGeom prst="mathPlus">
+            <a:avLst/>
+          </a:prstGeom>
+          <a:solidFill>
+            <a:srgbClr val="0000FF"/>
+          </a:solidFill>
+          <a:ln>
+            <a:solidFill>
+              <a:srgbClr val="0000FF"/>
+            </a:solidFill>
+          </a:ln>
+          <a:effectLst/>
+        </p:spPr>
+        <p:style>
+          <a:lnRef idx="1">
+            <a:schemeClr val="accent1"/>
+          </a:lnRef>
+          <a:fillRef idx="3">
+            <a:schemeClr val="accent1"/>
+          </a:fillRef>
+          <a:effectRef idx="2">
+            <a:schemeClr val="accent1"/>
+          </a:effectRef>
+          <a:fontRef idx="minor">
+            <a:schemeClr val="lt1"/>
+          </a:fontRef>
+        </p:style>
+        <p:txBody>
+          <a:bodyPr rtlCol="0" anchor="ctr"/>
+          <a:lstStyle/>
+          <a:p>
+            <a:pPr algn="ctr"/>
+            <a:endParaRPr lang="en-US"/>
+          </a:p>
+        </p:txBody>
+      </p:sp>
+      <p:cxnSp>
+        <p:nvCxnSpPr>
+          <p:cNvPr id="5" name="Straight Connector 4"/>
+          <p:cNvCxnSpPr>
+            <a:stCxn id="6" idx="4"/>
+            <a:endCxn id="7" idx="1"/>
+          </p:cNvCxnSpPr>
+          <p:nvPr/>
+        </p:nvCxnSpPr>
+        <p:spPr>
+          <a:xfrm>
+            <a:off x="3764639" y="1485655"/>
+            <a:ext cx="1368693" cy="3959148"/>
+          </a:xfrm>
+          <a:prstGeom prst="line">
+            <a:avLst/>
+          </a:prstGeom>
+          <a:ln>
+            <a:solidFill>
+              <a:schemeClr val="tx1"/>
+            </a:solidFill>
+            <a:prstDash val="dash"/>
+          </a:ln>
+          <a:effectLst/>
+        </p:spPr>
+        <p:style>
+          <a:lnRef idx="2">
+            <a:schemeClr val="accent1"/>
+          </a:lnRef>
+          <a:fillRef idx="0">
+            <a:schemeClr val="accent1"/>
+          </a:fillRef>
+          <a:effectRef idx="1">
+            <a:schemeClr val="accent1"/>
+          </a:effectRef>
+          <a:fontRef idx="minor">
+            <a:schemeClr val="tx1"/>
+          </a:fontRef>
+        </p:style>
+      </p:cxnSp>
+      <p:sp>
+        <p:nvSpPr>
+          <p:cNvPr id="6" name="Oval 5"/>
+          <p:cNvSpPr/>
+          <p:nvPr/>
+        </p:nvSpPr>
+        <p:spPr>
+          <a:xfrm>
+            <a:off x="3717606" y="1375895"/>
+            <a:ext cx="94066" cy="109760"/>
+          </a:xfrm>
+          <a:prstGeom prst="ellipse">
+            <a:avLst/>
+          </a:prstGeom>
+          <a:solidFill>
+            <a:srgbClr val="FF0000"/>
+          </a:solidFill>
+          <a:ln>
+            <a:solidFill>
+              <a:srgbClr val="FF0000"/>
+            </a:solidFill>
+          </a:ln>
+          <a:effectLst/>
+        </p:spPr>
+        <p:style>
+          <a:lnRef idx="1">
+            <a:schemeClr val="accent1"/>
+          </a:lnRef>
+          <a:fillRef idx="3">
+            <a:schemeClr val="accent1"/>
+          </a:fillRef>
+          <a:effectRef idx="2">
+            <a:schemeClr val="accent1"/>
+          </a:effectRef>
+          <a:fontRef idx="minor">
+            <a:schemeClr val="lt1"/>
+          </a:fontRef>
+        </p:style>
+        <p:txBody>
+          <a:bodyPr rtlCol="0" anchor="ctr"/>
+          <a:lstStyle/>
+          <a:p>
+            <a:pPr algn="ctr"/>
+            <a:endParaRPr lang="en-US"/>
+          </a:p>
+        </p:txBody>
+      </p:sp>
+      <p:sp>
+        <p:nvSpPr>
+          <p:cNvPr id="7" name="Oval 6"/>
+          <p:cNvSpPr/>
+          <p:nvPr/>
+        </p:nvSpPr>
+        <p:spPr>
+          <a:xfrm>
+            <a:off x="5119556" y="5428729"/>
+            <a:ext cx="94066" cy="109760"/>
+          </a:xfrm>
+          <a:prstGeom prst="ellipse">
+            <a:avLst/>
+          </a:prstGeom>
+          <a:solidFill>
+            <a:srgbClr val="FF0000"/>
+          </a:solidFill>
+          <a:ln>
+            <a:solidFill>
+              <a:srgbClr val="FF0000"/>
+            </a:solidFill>
+          </a:ln>
+          <a:effectLst/>
+        </p:spPr>
+        <p:style>
+          <a:lnRef idx="1">
+            <a:schemeClr val="accent1"/>
+          </a:lnRef>
+          <a:fillRef idx="3">
+            <a:schemeClr val="accent1"/>
+          </a:fillRef>
+          <a:effectRef idx="2">
+            <a:schemeClr val="accent1"/>
+          </a:effectRef>
+          <a:fontRef idx="minor">
+            <a:schemeClr val="lt1"/>
+          </a:fontRef>
+        </p:style>
+        <p:txBody>
+          <a:bodyPr rtlCol="0" anchor="ctr"/>
+          <a:lstStyle/>
+          <a:p>
+            <a:pPr algn="ctr"/>
+            <a:endParaRPr lang="en-US"/>
+          </a:p>
+        </p:txBody>
+      </p:sp>
+      <p:cxnSp>
+        <p:nvCxnSpPr>
+          <p:cNvPr id="56" name="Straight Arrow Connector 55"/>
+          <p:cNvCxnSpPr/>
+          <p:nvPr/>
+        </p:nvCxnSpPr>
+        <p:spPr>
+          <a:xfrm flipV="1">
+            <a:off x="4290718" y="2051926"/>
+            <a:ext cx="0" cy="927259"/>
+          </a:xfrm>
+          <a:prstGeom prst="straightConnector1">
+            <a:avLst/>
+          </a:prstGeom>
+          <a:ln w="38100">
+            <a:solidFill>
+              <a:schemeClr val="tx1"/>
+            </a:solidFill>
+            <a:tailEnd type="triangle" w="lg" len="lg"/>
+          </a:ln>
+          <a:effectLst/>
+        </p:spPr>
+        <p:style>
+          <a:lnRef idx="2">
+            <a:schemeClr val="accent1"/>
+          </a:lnRef>
+          <a:fillRef idx="0">
+            <a:schemeClr val="accent1"/>
+          </a:fillRef>
+          <a:effectRef idx="1">
+            <a:schemeClr val="accent1"/>
+          </a:effectRef>
+          <a:fontRef idx="minor">
+            <a:schemeClr val="tx1"/>
+          </a:fontRef>
+        </p:style>
+      </p:cxnSp>
+      <p:sp>
+        <p:nvSpPr>
+          <p:cNvPr id="59" name="Oval 58"/>
+          <p:cNvSpPr/>
+          <p:nvPr/>
+        </p:nvSpPr>
+        <p:spPr>
+          <a:xfrm>
+            <a:off x="4253670" y="2944916"/>
+            <a:ext cx="94066" cy="109760"/>
+          </a:xfrm>
+          <a:prstGeom prst="ellipse">
+            <a:avLst/>
+          </a:prstGeom>
+          <a:solidFill>
+            <a:srgbClr val="FF0000"/>
+          </a:solidFill>
+          <a:ln>
+            <a:solidFill>
+              <a:srgbClr val="FF0000"/>
+            </a:solidFill>
+          </a:ln>
+          <a:effectLst/>
+        </p:spPr>
+        <p:style>
+          <a:lnRef idx="1">
+            <a:schemeClr val="accent1"/>
+          </a:lnRef>
+          <a:fillRef idx="3">
+            <a:schemeClr val="accent1"/>
+          </a:fillRef>
+          <a:effectRef idx="2">
+            <a:schemeClr val="accent1"/>
+          </a:effectRef>
+          <a:fontRef idx="minor">
+            <a:schemeClr val="lt1"/>
+          </a:fontRef>
+        </p:style>
+        <p:txBody>
+          <a:bodyPr rtlCol="0" anchor="ctr"/>
+          <a:lstStyle/>
+          <a:p>
+            <a:pPr algn="ctr"/>
+            <a:endParaRPr lang="en-US"/>
+          </a:p>
+        </p:txBody>
+      </p:sp>
+      <p:sp>
+        <p:nvSpPr>
+          <p:cNvPr id="60" name="Oval 59"/>
+          <p:cNvSpPr/>
+          <p:nvPr/>
+        </p:nvSpPr>
+        <p:spPr>
+          <a:xfrm>
+            <a:off x="4535418" y="3828393"/>
+            <a:ext cx="94066" cy="109760"/>
+          </a:xfrm>
+          <a:prstGeom prst="ellipse">
+            <a:avLst/>
+          </a:prstGeom>
+          <a:solidFill>
+            <a:srgbClr val="FF0000"/>
+          </a:solidFill>
+          <a:ln>
+            <a:solidFill>
+              <a:srgbClr val="FF0000"/>
+            </a:solidFill>
+          </a:ln>
+          <a:effectLst/>
+        </p:spPr>
+        <p:style>
+          <a:lnRef idx="1">
+            <a:schemeClr val="accent1"/>
+          </a:lnRef>
+          <a:fillRef idx="3">
+            <a:schemeClr val="accent1"/>
+          </a:fillRef>
+          <a:effectRef idx="2">
+            <a:schemeClr val="accent1"/>
+          </a:effectRef>
+          <a:fontRef idx="minor">
+            <a:schemeClr val="lt1"/>
+          </a:fontRef>
+        </p:style>
+        <p:txBody>
+          <a:bodyPr rtlCol="0" anchor="ctr"/>
+          <a:lstStyle/>
+          <a:p>
+            <a:pPr algn="ctr"/>
+            <a:endParaRPr lang="en-US"/>
+          </a:p>
+        </p:txBody>
+      </p:sp>
+      <p:cxnSp>
+        <p:nvCxnSpPr>
+          <p:cNvPr id="61" name="Straight Arrow Connector 60"/>
+          <p:cNvCxnSpPr/>
+          <p:nvPr/>
+        </p:nvCxnSpPr>
+        <p:spPr>
+          <a:xfrm flipH="1">
+            <a:off x="4588794" y="3935616"/>
+            <a:ext cx="1" cy="949380"/>
+          </a:xfrm>
+          <a:prstGeom prst="straightConnector1">
+            <a:avLst/>
+          </a:prstGeom>
+          <a:ln w="38100">
+            <a:solidFill>
+              <a:schemeClr val="tx1"/>
+            </a:solidFill>
+            <a:tailEnd type="triangle" w="lg" len="lg"/>
+          </a:ln>
+          <a:effectLst/>
+        </p:spPr>
+        <p:style>
+          <a:lnRef idx="2">
+            <a:schemeClr val="accent1"/>
+          </a:lnRef>
+          <a:fillRef idx="0">
+            <a:schemeClr val="accent1"/>
+          </a:fillRef>
+          <a:effectRef idx="1">
+            <a:schemeClr val="accent1"/>
+          </a:effectRef>
+          <a:fontRef idx="minor">
+            <a:schemeClr val="tx1"/>
+          </a:fontRef>
+        </p:style>
+      </p:cxnSp>
+      <p:pic>
+        <p:nvPicPr>
+          <p:cNvPr id="81" name="Picture 80"/>
+          <p:cNvPicPr>
+            <a:picLocks noChangeAspect="1"/>
+          </p:cNvPicPr>
+          <p:nvPr/>
+        </p:nvPicPr>
+        <p:blipFill>
+          <a:blip r:embed="rId4"/>
+          <a:stretch>
+            <a:fillRect/>
+          </a:stretch>
+        </p:blipFill>
+        <p:spPr>
+          <a:xfrm>
+            <a:off x="6457045" y="4521497"/>
+            <a:ext cx="264697" cy="281241"/>
+          </a:xfrm>
+          <a:prstGeom prst="rect">
+            <a:avLst/>
+          </a:prstGeom>
+        </p:spPr>
+      </p:pic>
+      <p:pic>
+        <p:nvPicPr>
+          <p:cNvPr id="82" name="Picture 81"/>
+          <p:cNvPicPr>
+            <a:picLocks noChangeAspect="1"/>
+          </p:cNvPicPr>
+          <p:nvPr/>
+        </p:nvPicPr>
+        <p:blipFill>
+          <a:blip r:embed="rId5">
+            <a:clrChange>
+              <a:clrFrom>
+                <a:srgbClr val="53845C"/>
+              </a:clrFrom>
+              <a:clrTo>
+                <a:srgbClr val="53845C">
+                  <a:alpha val="0"/>
+                </a:srgbClr>
+              </a:clrTo>
+            </a:clrChange>
+          </a:blip>
+          <a:stretch>
+            <a:fillRect/>
+          </a:stretch>
+        </p:blipFill>
+        <p:spPr>
+          <a:xfrm>
+            <a:off x="5366669" y="2491356"/>
+            <a:ext cx="381000" cy="292100"/>
+          </a:xfrm>
+          <a:prstGeom prst="rect">
+            <a:avLst/>
+          </a:prstGeom>
+        </p:spPr>
+      </p:pic>
+      <p:pic>
+        <p:nvPicPr>
+          <p:cNvPr id="83" name="Picture 82"/>
+          <p:cNvPicPr>
+            <a:picLocks noChangeAspect="1"/>
+          </p:cNvPicPr>
+          <p:nvPr/>
+        </p:nvPicPr>
+        <p:blipFill>
+          <a:blip r:embed="rId6">
+            <a:clrChange>
+              <a:clrFrom>
+                <a:srgbClr val="53845C"/>
+              </a:clrFrom>
+              <a:clrTo>
+                <a:srgbClr val="53845C">
+                  <a:alpha val="0"/>
+                </a:srgbClr>
+              </a:clrTo>
+            </a:clrChange>
+          </a:blip>
+          <a:stretch>
+            <a:fillRect/>
+          </a:stretch>
+        </p:blipFill>
+        <p:spPr>
+          <a:xfrm>
+            <a:off x="3296658" y="4140061"/>
+            <a:ext cx="393700" cy="292100"/>
+          </a:xfrm>
+          <a:prstGeom prst="rect">
+            <a:avLst/>
+          </a:prstGeom>
+        </p:spPr>
+      </p:pic>
+      <p:pic>
+        <p:nvPicPr>
+          <p:cNvPr id="95" name="Picture 94"/>
+          <p:cNvPicPr>
+            <a:picLocks noChangeAspect="1"/>
+          </p:cNvPicPr>
+          <p:nvPr/>
+        </p:nvPicPr>
+        <p:blipFill>
+          <a:blip r:embed="rId7"/>
+          <a:stretch>
+            <a:fillRect/>
+          </a:stretch>
+        </p:blipFill>
+        <p:spPr>
+          <a:xfrm>
+            <a:off x="4374972" y="4935541"/>
+            <a:ext cx="444500" cy="292100"/>
+          </a:xfrm>
+          <a:prstGeom prst="rect">
+            <a:avLst/>
+          </a:prstGeom>
+        </p:spPr>
+      </p:pic>
+      <p:pic>
+        <p:nvPicPr>
+          <p:cNvPr id="96" name="Picture 95"/>
+          <p:cNvPicPr>
+            <a:picLocks noChangeAspect="1"/>
+          </p:cNvPicPr>
+          <p:nvPr/>
+        </p:nvPicPr>
+        <p:blipFill>
+          <a:blip r:embed="rId8"/>
+          <a:stretch>
+            <a:fillRect/>
+          </a:stretch>
+        </p:blipFill>
+        <p:spPr>
+          <a:xfrm>
+            <a:off x="4114904" y="1759826"/>
+            <a:ext cx="431800" cy="292100"/>
+          </a:xfrm>
+          <a:prstGeom prst="rect">
+            <a:avLst/>
+          </a:prstGeom>
+        </p:spPr>
+      </p:pic>
+      <p:cxnSp>
+        <p:nvCxnSpPr>
+          <p:cNvPr id="98" name="Straight Connector 97"/>
+          <p:cNvCxnSpPr>
+            <a:stCxn id="83" idx="3"/>
+            <a:endCxn id="60" idx="2"/>
+          </p:cNvCxnSpPr>
+          <p:nvPr/>
+        </p:nvCxnSpPr>
+        <p:spPr>
+          <a:xfrm flipV="1">
+            <a:off x="3690358" y="3883273"/>
+            <a:ext cx="845060" cy="402838"/>
+          </a:xfrm>
+          <a:prstGeom prst="line">
+            <a:avLst/>
+          </a:prstGeom>
+          <a:ln>
+            <a:solidFill>
+              <a:schemeClr val="tx1"/>
+            </a:solidFill>
+          </a:ln>
+          <a:effectLst/>
+        </p:spPr>
+        <p:style>
+          <a:lnRef idx="2">
+            <a:schemeClr val="accent1"/>
+          </a:lnRef>
+          <a:fillRef idx="0">
+            <a:schemeClr val="accent1"/>
+          </a:fillRef>
+          <a:effectRef idx="1">
+            <a:schemeClr val="accent1"/>
+          </a:effectRef>
+          <a:fontRef idx="minor">
+            <a:schemeClr val="tx1"/>
+          </a:fontRef>
+        </p:style>
+      </p:cxnSp>
+      <p:cxnSp>
+        <p:nvCxnSpPr>
+          <p:cNvPr id="100" name="Straight Connector 99"/>
+          <p:cNvCxnSpPr>
+            <a:stCxn id="59" idx="7"/>
+            <a:endCxn id="82" idx="1"/>
+          </p:cNvCxnSpPr>
+          <p:nvPr/>
+        </p:nvCxnSpPr>
+        <p:spPr>
+          <a:xfrm flipV="1">
+            <a:off x="4333960" y="2637406"/>
+            <a:ext cx="1032709" cy="323584"/>
+          </a:xfrm>
+          <a:prstGeom prst="line">
+            <a:avLst/>
+          </a:prstGeom>
+          <a:ln>
+            <a:solidFill>
+              <a:schemeClr val="tx1"/>
+            </a:solidFill>
+          </a:ln>
+          <a:effectLst/>
+        </p:spPr>
+        <p:style>
+          <a:lnRef idx="2">
+            <a:schemeClr val="accent1"/>
+          </a:lnRef>
+          <a:fillRef idx="0">
+            <a:schemeClr val="accent1"/>
+          </a:fillRef>
+          <a:effectRef idx="1">
+            <a:schemeClr val="accent1"/>
+          </a:effectRef>
+          <a:fontRef idx="minor">
+            <a:schemeClr val="tx1"/>
+          </a:fontRef>
+        </p:style>
+      </p:cxnSp>
+      <p:cxnSp>
+        <p:nvCxnSpPr>
+          <p:cNvPr id="114" name="Straight Connector 113"/>
+          <p:cNvCxnSpPr>
+            <a:stCxn id="81" idx="1"/>
+            <a:endCxn id="51" idx="0"/>
+          </p:cNvCxnSpPr>
+          <p:nvPr/>
+        </p:nvCxnSpPr>
+        <p:spPr>
+          <a:xfrm flipH="1" flipV="1">
+            <a:off x="4909986" y="3453215"/>
+            <a:ext cx="1547059" cy="1208903"/>
+          </a:xfrm>
+          <a:prstGeom prst="line">
+            <a:avLst/>
+          </a:prstGeom>
+          <a:ln>
+            <a:solidFill>
+              <a:schemeClr val="tx1"/>
+            </a:solidFill>
+          </a:ln>
+          <a:effectLst/>
+        </p:spPr>
+        <p:style>
+          <a:lnRef idx="2">
+            <a:schemeClr val="accent1"/>
+          </a:lnRef>
+          <a:fillRef idx="0">
+            <a:schemeClr val="accent1"/>
+          </a:fillRef>
+          <a:effectRef idx="1">
+            <a:schemeClr val="accent1"/>
+          </a:effectRef>
+          <a:fontRef idx="minor">
+            <a:schemeClr val="tx1"/>
+          </a:fontRef>
+        </p:style>
+      </p:cxnSp>
+      <p:pic>
+        <p:nvPicPr>
+          <p:cNvPr id="2" name="Picture 1"/>
+          <p:cNvPicPr>
+            <a:picLocks noChangeAspect="1"/>
+          </p:cNvPicPr>
+          <p:nvPr/>
+        </p:nvPicPr>
+        <p:blipFill>
+          <a:blip r:embed="rId9"/>
+          <a:stretch>
+            <a:fillRect/>
+          </a:stretch>
+        </p:blipFill>
+        <p:spPr>
+          <a:xfrm>
+            <a:off x="1981760" y="1742972"/>
+            <a:ext cx="962022" cy="603301"/>
+          </a:xfrm>
+          <a:prstGeom prst="rect">
+            <a:avLst/>
+          </a:prstGeom>
+        </p:spPr>
+      </p:pic>
+      <p:cxnSp>
+        <p:nvCxnSpPr>
+          <p:cNvPr id="52" name="Straight Connector 51"/>
+          <p:cNvCxnSpPr>
+            <a:stCxn id="2" idx="3"/>
+          </p:cNvCxnSpPr>
+          <p:nvPr/>
+        </p:nvCxnSpPr>
+        <p:spPr>
+          <a:xfrm flipV="1">
+            <a:off x="2943782" y="1883583"/>
+            <a:ext cx="867890" cy="161040"/>
+          </a:xfrm>
+          <a:prstGeom prst="line">
+            <a:avLst/>
+          </a:prstGeom>
+          <a:ln>
+            <a:solidFill>
+              <a:schemeClr val="tx1"/>
+            </a:solidFill>
+          </a:ln>
+          <a:effectLst/>
+        </p:spPr>
+        <p:style>
+          <a:lnRef idx="2">
+            <a:schemeClr val="accent1"/>
+          </a:lnRef>
+          <a:fillRef idx="0">
+            <a:schemeClr val="accent1"/>
+          </a:fillRef>
+          <a:effectRef idx="1">
+            <a:schemeClr val="accent1"/>
+          </a:effectRef>
+          <a:fontRef idx="minor">
+            <a:schemeClr val="tx1"/>
+          </a:fontRef>
+        </p:style>
+      </p:cxnSp>
+      <p:pic>
+        <p:nvPicPr>
+          <p:cNvPr id="11" name="Picture 10"/>
+          <p:cNvPicPr>
+            <a:picLocks noChangeAspect="1"/>
+          </p:cNvPicPr>
+          <p:nvPr/>
+        </p:nvPicPr>
+        <p:blipFill>
+          <a:blip r:embed="rId10"/>
+          <a:stretch>
+            <a:fillRect/>
+          </a:stretch>
+        </p:blipFill>
+        <p:spPr>
+          <a:xfrm>
+            <a:off x="4849226" y="1083028"/>
+            <a:ext cx="387840" cy="329664"/>
+          </a:xfrm>
+          <a:prstGeom prst="rect">
+            <a:avLst/>
+          </a:prstGeom>
+        </p:spPr>
+      </p:pic>
+      <p:cxnSp>
+        <p:nvCxnSpPr>
+          <p:cNvPr id="62" name="Straight Connector 61"/>
+          <p:cNvCxnSpPr>
+            <a:stCxn id="6" idx="6"/>
+            <a:endCxn id="11" idx="1"/>
+          </p:cNvCxnSpPr>
+          <p:nvPr/>
+        </p:nvCxnSpPr>
+        <p:spPr>
+          <a:xfrm flipV="1">
+            <a:off x="3811672" y="1247860"/>
+            <a:ext cx="1037554" cy="182915"/>
+          </a:xfrm>
+          <a:prstGeom prst="line">
+            <a:avLst/>
+          </a:prstGeom>
+          <a:ln>
+            <a:solidFill>
+              <a:schemeClr val="tx1"/>
+            </a:solidFill>
+          </a:ln>
+          <a:effectLst/>
+        </p:spPr>
+        <p:style>
+          <a:lnRef idx="2">
+            <a:schemeClr val="accent1"/>
+          </a:lnRef>
+          <a:fillRef idx="0">
+            <a:schemeClr val="accent1"/>
+          </a:fillRef>
+          <a:effectRef idx="1">
+            <a:schemeClr val="accent1"/>
+          </a:effectRef>
+          <a:fontRef idx="minor">
+            <a:schemeClr val="tx1"/>
+          </a:fontRef>
+        </p:style>
+      </p:cxnSp>
+      <p:pic>
+        <p:nvPicPr>
+          <p:cNvPr id="19" name="Picture 18"/>
+          <p:cNvPicPr>
+            <a:picLocks noChangeAspect="1"/>
+          </p:cNvPicPr>
+          <p:nvPr/>
+        </p:nvPicPr>
+        <p:blipFill>
+          <a:blip r:embed="rId11"/>
+          <a:stretch>
+            <a:fillRect/>
+          </a:stretch>
+        </p:blipFill>
+        <p:spPr>
+          <a:xfrm>
+            <a:off x="3390226" y="5332675"/>
+            <a:ext cx="348301" cy="411628"/>
+          </a:xfrm>
+          <a:prstGeom prst="rect">
+            <a:avLst/>
+          </a:prstGeom>
+        </p:spPr>
+      </p:pic>
+      <p:cxnSp>
+        <p:nvCxnSpPr>
+          <p:cNvPr id="65" name="Straight Connector 64"/>
+          <p:cNvCxnSpPr>
+            <a:stCxn id="19" idx="3"/>
+            <a:endCxn id="7" idx="1"/>
+          </p:cNvCxnSpPr>
+          <p:nvPr/>
+        </p:nvCxnSpPr>
+        <p:spPr>
+          <a:xfrm flipV="1">
+            <a:off x="3738527" y="5444803"/>
+            <a:ext cx="1394805" cy="93686"/>
+          </a:xfrm>
+          <a:prstGeom prst="line">
+            <a:avLst/>
+          </a:prstGeom>
+          <a:ln>
+            <a:solidFill>
+              <a:schemeClr val="tx1"/>
+            </a:solidFill>
+          </a:ln>
+          <a:effectLst/>
+        </p:spPr>
+        <p:style>
+          <a:lnRef idx="2">
+            <a:schemeClr val="accent1"/>
+          </a:lnRef>
+          <a:fillRef idx="0">
+            <a:schemeClr val="accent1"/>
+          </a:fillRef>
+          <a:effectRef idx="1">
+            <a:schemeClr val="accent1"/>
+          </a:effectRef>
+          <a:fontRef idx="minor">
+            <a:schemeClr val="tx1"/>
+          </a:fontRef>
+        </p:style>
+      </p:cxnSp>
+    </p:spTree>
+    <p:extLst>
+      <p:ext uri="{BB962C8B-B14F-4D97-AF65-F5344CB8AC3E}">
+        <p14:creationId xmlns:p14="http://schemas.microsoft.com/office/powerpoint/2010/main" val="3872345405"/>
+      </p:ext>
+    </p:extLst>
+  </p:cSld>
+  <p:clrMapOvr>
+    <a:masterClrMapping/>
+  </p:clrMapOvr>
+  <p:timing>
+    <p:tnLst>
+      <p:par>
+        <p:cTn xmlns:p14="http://schemas.microsoft.com/office/powerpoint/2010/main" id="1" dur="indefinite" restart="never" nodeType="tmRoot"/>
+      </p:par>
+    </p:tnLst>
+  </p:timing>
+</p:sld>
+</file>
+
 <file path=ppt/slides/slide2.xml><?xml version="1.0" encoding="utf-8"?>
 <p:sld xmlns:a="http://schemas.openxmlformats.org/drawingml/2006/main" xmlns:r="http://schemas.openxmlformats.org/officeDocument/2006/relationships" xmlns:p="http://schemas.openxmlformats.org/presentationml/2006/main">
   <p:cSld>
@@ -3751,11 +5231,7 @@
           <a:p>
             <a:r>
               <a:rPr lang="en-US" sz="2400" dirty="0" smtClean="0"/>
-              <a:t> </a:t>
-            </a:r>
-            <a:r>
-              <a:rPr lang="en-US" sz="2400" dirty="0" smtClean="0"/>
-              <a:t>Pose</a:t>
+              <a:t> Pose</a:t>
             </a:r>
             <a:endParaRPr lang="en-US" dirty="0"/>
           </a:p>
@@ -3785,11 +5261,7 @@
           <a:p>
             <a:r>
               <a:rPr lang="en-US" sz="2400" dirty="0" smtClean="0"/>
-              <a:t> </a:t>
-            </a:r>
-            <a:r>
-              <a:rPr lang="en-US" sz="2400" dirty="0" smtClean="0"/>
-              <a:t>Shape</a:t>
+              <a:t> Shape</a:t>
             </a:r>
             <a:r>
               <a:rPr lang="en-US" dirty="0" smtClean="0"/>
@@ -4907,4 +6379,324 @@
   </a:objectDefaults>
   <a:extraClrSchemeLst/>
 </a:theme>
+</file>
+
+<file path=ppt/theme/theme2.xml><?xml version="1.0" encoding="utf-8"?>
+<a:theme xmlns:a="http://schemas.openxmlformats.org/drawingml/2006/main" name="Office Theme">
+  <a:themeElements>
+    <a:clrScheme name="Office">
+      <a:dk1>
+        <a:sysClr val="windowText" lastClr="000000"/>
+      </a:dk1>
+      <a:lt1>
+        <a:sysClr val="window" lastClr="FFFFFF"/>
+      </a:lt1>
+      <a:dk2>
+        <a:srgbClr val="1F497D"/>
+      </a:dk2>
+      <a:lt2>
+        <a:srgbClr val="EEECE1"/>
+      </a:lt2>
+      <a:accent1>
+        <a:srgbClr val="4F81BD"/>
+      </a:accent1>
+      <a:accent2>
+        <a:srgbClr val="C0504D"/>
+      </a:accent2>
+      <a:accent3>
+        <a:srgbClr val="9BBB59"/>
+      </a:accent3>
+      <a:accent4>
+        <a:srgbClr val="8064A2"/>
+      </a:accent4>
+      <a:accent5>
+        <a:srgbClr val="4BACC6"/>
+      </a:accent5>
+      <a:accent6>
+        <a:srgbClr val="F79646"/>
+      </a:accent6>
+      <a:hlink>
+        <a:srgbClr val="0000FF"/>
+      </a:hlink>
+      <a:folHlink>
+        <a:srgbClr val="800080"/>
+      </a:folHlink>
+    </a:clrScheme>
+    <a:fontScheme name="Office">
+      <a:majorFont>
+        <a:latin typeface="Calibri"/>
+        <a:ea typeface=""/>
+        <a:cs typeface=""/>
+        <a:font script="Jpan" typeface="ＭＳ Ｐゴシック"/>
+        <a:font script="Hang" typeface="맑은 고딕"/>
+        <a:font script="Hans" typeface="宋体"/>
+        <a:font script="Hant" typeface="新細明體"/>
+        <a:font script="Arab" typeface="Times New Roman"/>
+        <a:font script="Hebr" typeface="Times New Roman"/>
+        <a:font script="Thai" typeface="Angsana New"/>
+        <a:font script="Ethi" typeface="Nyala"/>
+        <a:font script="Beng" typeface="Vrinda"/>
+        <a:font script="Gujr" typeface="Shruti"/>
+        <a:font script="Khmr" typeface="MoolBoran"/>
+        <a:font script="Knda" typeface="Tunga"/>
+        <a:font script="Guru" typeface="Raavi"/>
+        <a:font script="Cans" typeface="Euphemia"/>
+        <a:font script="Cher" typeface="Plantagenet Cherokee"/>
+        <a:font script="Yiii" typeface="Microsoft Yi Baiti"/>
+        <a:font script="Tibt" typeface="Microsoft Himalaya"/>
+        <a:font script="Thaa" typeface="MV Boli"/>
+        <a:font script="Deva" typeface="Mangal"/>
+        <a:font script="Telu" typeface="Gautami"/>
+        <a:font script="Taml" typeface="Latha"/>
+        <a:font script="Syrc" typeface="Estrangelo Edessa"/>
+        <a:font script="Orya" typeface="Kalinga"/>
+        <a:font script="Mlym" typeface="Kartika"/>
+        <a:font script="Laoo" typeface="DokChampa"/>
+        <a:font script="Sinh" typeface="Iskoola Pota"/>
+        <a:font script="Mong" typeface="Mongolian Baiti"/>
+        <a:font script="Viet" typeface="Times New Roman"/>
+        <a:font script="Uigh" typeface="Microsoft Uighur"/>
+        <a:font script="Geor" typeface="Sylfaen"/>
+      </a:majorFont>
+      <a:minorFont>
+        <a:latin typeface="Calibri"/>
+        <a:ea typeface=""/>
+        <a:cs typeface=""/>
+        <a:font script="Jpan" typeface="ＭＳ Ｐゴシック"/>
+        <a:font script="Hang" typeface="맑은 고딕"/>
+        <a:font script="Hans" typeface="宋体"/>
+        <a:font script="Hant" typeface="新細明體"/>
+        <a:font script="Arab" typeface="Arial"/>
+        <a:font script="Hebr" typeface="Arial"/>
+        <a:font script="Thai" typeface="Cordia New"/>
+        <a:font script="Ethi" typeface="Nyala"/>
+        <a:font script="Beng" typeface="Vrinda"/>
+        <a:font script="Gujr" typeface="Shruti"/>
+        <a:font script="Khmr" typeface="DaunPenh"/>
+        <a:font script="Knda" typeface="Tunga"/>
+        <a:font script="Guru" typeface="Raavi"/>
+        <a:font script="Cans" typeface="Euphemia"/>
+        <a:font script="Cher" typeface="Plantagenet Cherokee"/>
+        <a:font script="Yiii" typeface="Microsoft Yi Baiti"/>
+        <a:font script="Tibt" typeface="Microsoft Himalaya"/>
+        <a:font script="Thaa" typeface="MV Boli"/>
+        <a:font script="Deva" typeface="Mangal"/>
+        <a:font script="Telu" typeface="Gautami"/>
+        <a:font script="Taml" typeface="Latha"/>
+        <a:font script="Syrc" typeface="Estrangelo Edessa"/>
+        <a:font script="Orya" typeface="Kalinga"/>
+        <a:font script="Mlym" typeface="Kartika"/>
+        <a:font script="Laoo" typeface="DokChampa"/>
+        <a:font script="Sinh" typeface="Iskoola Pota"/>
+        <a:font script="Mong" typeface="Mongolian Baiti"/>
+        <a:font script="Viet" typeface="Arial"/>
+        <a:font script="Uigh" typeface="Microsoft Uighur"/>
+        <a:font script="Geor" typeface="Sylfaen"/>
+      </a:minorFont>
+    </a:fontScheme>
+    <a:fmtScheme name="Office">
+      <a:fillStyleLst>
+        <a:solidFill>
+          <a:schemeClr val="phClr"/>
+        </a:solidFill>
+        <a:gradFill rotWithShape="1">
+          <a:gsLst>
+            <a:gs pos="0">
+              <a:schemeClr val="phClr">
+                <a:tint val="50000"/>
+                <a:satMod val="300000"/>
+              </a:schemeClr>
+            </a:gs>
+            <a:gs pos="35000">
+              <a:schemeClr val="phClr">
+                <a:tint val="37000"/>
+                <a:satMod val="300000"/>
+              </a:schemeClr>
+            </a:gs>
+            <a:gs pos="100000">
+              <a:schemeClr val="phClr">
+                <a:tint val="15000"/>
+                <a:satMod val="350000"/>
+              </a:schemeClr>
+            </a:gs>
+          </a:gsLst>
+          <a:lin ang="16200000" scaled="1"/>
+        </a:gradFill>
+        <a:gradFill rotWithShape="1">
+          <a:gsLst>
+            <a:gs pos="0">
+              <a:schemeClr val="phClr">
+                <a:tint val="100000"/>
+                <a:shade val="100000"/>
+                <a:satMod val="130000"/>
+              </a:schemeClr>
+            </a:gs>
+            <a:gs pos="100000">
+              <a:schemeClr val="phClr">
+                <a:tint val="50000"/>
+                <a:shade val="100000"/>
+                <a:satMod val="350000"/>
+              </a:schemeClr>
+            </a:gs>
+          </a:gsLst>
+          <a:lin ang="16200000" scaled="0"/>
+        </a:gradFill>
+      </a:fillStyleLst>
+      <a:lnStyleLst>
+        <a:ln w="9525" cap="flat" cmpd="sng" algn="ctr">
+          <a:solidFill>
+            <a:schemeClr val="phClr">
+              <a:shade val="95000"/>
+              <a:satMod val="105000"/>
+            </a:schemeClr>
+          </a:solidFill>
+          <a:prstDash val="solid"/>
+        </a:ln>
+        <a:ln w="25400" cap="flat" cmpd="sng" algn="ctr">
+          <a:solidFill>
+            <a:schemeClr val="phClr"/>
+          </a:solidFill>
+          <a:prstDash val="solid"/>
+        </a:ln>
+        <a:ln w="38100" cap="flat" cmpd="sng" algn="ctr">
+          <a:solidFill>
+            <a:schemeClr val="phClr"/>
+          </a:solidFill>
+          <a:prstDash val="solid"/>
+        </a:ln>
+      </a:lnStyleLst>
+      <a:effectStyleLst>
+        <a:effectStyle>
+          <a:effectLst>
+            <a:outerShdw blurRad="40000" dist="20000" dir="5400000" rotWithShape="0">
+              <a:srgbClr val="000000">
+                <a:alpha val="38000"/>
+              </a:srgbClr>
+            </a:outerShdw>
+          </a:effectLst>
+        </a:effectStyle>
+        <a:effectStyle>
+          <a:effectLst>
+            <a:outerShdw blurRad="40000" dist="23000" dir="5400000" rotWithShape="0">
+              <a:srgbClr val="000000">
+                <a:alpha val="35000"/>
+              </a:srgbClr>
+            </a:outerShdw>
+          </a:effectLst>
+        </a:effectStyle>
+        <a:effectStyle>
+          <a:effectLst>
+            <a:outerShdw blurRad="40000" dist="23000" dir="5400000" rotWithShape="0">
+              <a:srgbClr val="000000">
+                <a:alpha val="35000"/>
+              </a:srgbClr>
+            </a:outerShdw>
+          </a:effectLst>
+          <a:scene3d>
+            <a:camera prst="orthographicFront">
+              <a:rot lat="0" lon="0" rev="0"/>
+            </a:camera>
+            <a:lightRig rig="threePt" dir="t">
+              <a:rot lat="0" lon="0" rev="1200000"/>
+            </a:lightRig>
+          </a:scene3d>
+          <a:sp3d>
+            <a:bevelT w="63500" h="25400"/>
+          </a:sp3d>
+        </a:effectStyle>
+      </a:effectStyleLst>
+      <a:bgFillStyleLst>
+        <a:solidFill>
+          <a:schemeClr val="phClr"/>
+        </a:solidFill>
+        <a:gradFill rotWithShape="1">
+          <a:gsLst>
+            <a:gs pos="0">
+              <a:schemeClr val="phClr">
+                <a:tint val="40000"/>
+                <a:satMod val="350000"/>
+              </a:schemeClr>
+            </a:gs>
+            <a:gs pos="40000">
+              <a:schemeClr val="phClr">
+                <a:tint val="45000"/>
+                <a:shade val="99000"/>
+                <a:satMod val="350000"/>
+              </a:schemeClr>
+            </a:gs>
+            <a:gs pos="100000">
+              <a:schemeClr val="phClr">
+                <a:shade val="20000"/>
+                <a:satMod val="255000"/>
+              </a:schemeClr>
+            </a:gs>
+          </a:gsLst>
+          <a:path path="circle">
+            <a:fillToRect l="50000" t="-80000" r="50000" b="180000"/>
+          </a:path>
+        </a:gradFill>
+        <a:gradFill rotWithShape="1">
+          <a:gsLst>
+            <a:gs pos="0">
+              <a:schemeClr val="phClr">
+                <a:tint val="80000"/>
+                <a:satMod val="300000"/>
+              </a:schemeClr>
+            </a:gs>
+            <a:gs pos="100000">
+              <a:schemeClr val="phClr">
+                <a:shade val="30000"/>
+                <a:satMod val="200000"/>
+              </a:schemeClr>
+            </a:gs>
+          </a:gsLst>
+          <a:path path="circle">
+            <a:fillToRect l="50000" t="50000" r="50000" b="50000"/>
+          </a:path>
+        </a:gradFill>
+      </a:bgFillStyleLst>
+    </a:fmtScheme>
+  </a:themeElements>
+  <a:objectDefaults>
+    <a:spDef>
+      <a:spPr/>
+      <a:bodyPr/>
+      <a:lstStyle/>
+      <a:style>
+        <a:lnRef idx="1">
+          <a:schemeClr val="accent1"/>
+        </a:lnRef>
+        <a:fillRef idx="3">
+          <a:schemeClr val="accent1"/>
+        </a:fillRef>
+        <a:effectRef idx="2">
+          <a:schemeClr val="accent1"/>
+        </a:effectRef>
+        <a:fontRef idx="minor">
+          <a:schemeClr val="lt1"/>
+        </a:fontRef>
+      </a:style>
+    </a:spDef>
+    <a:lnDef>
+      <a:spPr/>
+      <a:bodyPr/>
+      <a:lstStyle/>
+      <a:style>
+        <a:lnRef idx="2">
+          <a:schemeClr val="accent1"/>
+        </a:lnRef>
+        <a:fillRef idx="0">
+          <a:schemeClr val="accent1"/>
+        </a:fillRef>
+        <a:effectRef idx="1">
+          <a:schemeClr val="accent1"/>
+        </a:effectRef>
+        <a:fontRef idx="minor">
+          <a:schemeClr val="tx1"/>
+        </a:fontRef>
+      </a:style>
+    </a:lnDef>
+  </a:objectDefaults>
+  <a:extraClrSchemeLst/>
+</a:theme>
 </file>
</xml_diff>

<commit_message>
New graphical model figure
</commit_message>
<xml_diff>
--- a/figures.pptx
+++ b/figures.pptx
@@ -5,7 +5,7 @@
     <p:sldMasterId id="2147483648" r:id="rId1"/>
   </p:sldMasterIdLst>
   <p:notesMasterIdLst>
-    <p:notesMasterId r:id="rId13"/>
+    <p:notesMasterId r:id="rId14"/>
   </p:notesMasterIdLst>
   <p:sldIdLst>
     <p:sldId id="264" r:id="rId2"/>
@@ -16,9 +16,10 @@
     <p:sldId id="260" r:id="rId7"/>
     <p:sldId id="261" r:id="rId8"/>
     <p:sldId id="263" r:id="rId9"/>
-    <p:sldId id="266" r:id="rId10"/>
-    <p:sldId id="267" r:id="rId11"/>
-    <p:sldId id="268" r:id="rId12"/>
+    <p:sldId id="269" r:id="rId10"/>
+    <p:sldId id="266" r:id="rId11"/>
+    <p:sldId id="267" r:id="rId12"/>
+    <p:sldId id="268" r:id="rId13"/>
   </p:sldIdLst>
   <p:sldSz cx="9144000" cy="6858000" type="screen4x3"/>
   <p:notesSz cx="6858000" cy="9144000"/>
@@ -202,7 +203,7 @@
           <a:p>
             <a:fld id="{21EB0F01-5E20-0043-8930-939DDC118492}" type="datetimeFigureOut">
               <a:rPr lang="en-US" smtClean="0"/>
-              <a:t>3/2/15</a:t>
+              <a:t>3/15/15</a:t>
             </a:fld>
             <a:endParaRPr lang="en-US"/>
           </a:p>
@@ -539,7 +540,7 @@
           <a:p>
             <a:fld id="{C5771C86-A517-F54C-BE81-890F1891BAD5}" type="slidenum">
               <a:rPr lang="en-US" smtClean="0"/>
-              <a:t>10</a:t>
+              <a:t>11</a:t>
             </a:fld>
             <a:endParaRPr lang="en-US"/>
           </a:p>
@@ -739,7 +740,7 @@
           <a:p>
             <a:fld id="{F382D2B8-5B0C-E947-8C66-90157F7E06E9}" type="datetimeFigureOut">
               <a:rPr lang="en-US" smtClean="0"/>
-              <a:t>3/2/15</a:t>
+              <a:t>3/15/15</a:t>
             </a:fld>
             <a:endParaRPr lang="en-US"/>
           </a:p>
@@ -909,7 +910,7 @@
           <a:p>
             <a:fld id="{F382D2B8-5B0C-E947-8C66-90157F7E06E9}" type="datetimeFigureOut">
               <a:rPr lang="en-US" smtClean="0"/>
-              <a:t>3/2/15</a:t>
+              <a:t>3/15/15</a:t>
             </a:fld>
             <a:endParaRPr lang="en-US"/>
           </a:p>
@@ -1089,7 +1090,7 @@
           <a:p>
             <a:fld id="{F382D2B8-5B0C-E947-8C66-90157F7E06E9}" type="datetimeFigureOut">
               <a:rPr lang="en-US" smtClean="0"/>
-              <a:t>3/2/15</a:t>
+              <a:t>3/15/15</a:t>
             </a:fld>
             <a:endParaRPr lang="en-US"/>
           </a:p>
@@ -1259,7 +1260,7 @@
           <a:p>
             <a:fld id="{F382D2B8-5B0C-E947-8C66-90157F7E06E9}" type="datetimeFigureOut">
               <a:rPr lang="en-US" smtClean="0"/>
-              <a:t>3/2/15</a:t>
+              <a:t>3/15/15</a:t>
             </a:fld>
             <a:endParaRPr lang="en-US"/>
           </a:p>
@@ -1505,7 +1506,7 @@
           <a:p>
             <a:fld id="{F382D2B8-5B0C-E947-8C66-90157F7E06E9}" type="datetimeFigureOut">
               <a:rPr lang="en-US" smtClean="0"/>
-              <a:t>3/2/15</a:t>
+              <a:t>3/15/15</a:t>
             </a:fld>
             <a:endParaRPr lang="en-US"/>
           </a:p>
@@ -1793,7 +1794,7 @@
           <a:p>
             <a:fld id="{F382D2B8-5B0C-E947-8C66-90157F7E06E9}" type="datetimeFigureOut">
               <a:rPr lang="en-US" smtClean="0"/>
-              <a:t>3/2/15</a:t>
+              <a:t>3/15/15</a:t>
             </a:fld>
             <a:endParaRPr lang="en-US"/>
           </a:p>
@@ -2215,7 +2216,7 @@
           <a:p>
             <a:fld id="{F382D2B8-5B0C-E947-8C66-90157F7E06E9}" type="datetimeFigureOut">
               <a:rPr lang="en-US" smtClean="0"/>
-              <a:t>3/2/15</a:t>
+              <a:t>3/15/15</a:t>
             </a:fld>
             <a:endParaRPr lang="en-US"/>
           </a:p>
@@ -2333,7 +2334,7 @@
           <a:p>
             <a:fld id="{F382D2B8-5B0C-E947-8C66-90157F7E06E9}" type="datetimeFigureOut">
               <a:rPr lang="en-US" smtClean="0"/>
-              <a:t>3/2/15</a:t>
+              <a:t>3/15/15</a:t>
             </a:fld>
             <a:endParaRPr lang="en-US"/>
           </a:p>
@@ -2428,7 +2429,7 @@
           <a:p>
             <a:fld id="{F382D2B8-5B0C-E947-8C66-90157F7E06E9}" type="datetimeFigureOut">
               <a:rPr lang="en-US" smtClean="0"/>
-              <a:t>3/2/15</a:t>
+              <a:t>3/15/15</a:t>
             </a:fld>
             <a:endParaRPr lang="en-US"/>
           </a:p>
@@ -2705,7 +2706,7 @@
           <a:p>
             <a:fld id="{F382D2B8-5B0C-E947-8C66-90157F7E06E9}" type="datetimeFigureOut">
               <a:rPr lang="en-US" smtClean="0"/>
-              <a:t>3/2/15</a:t>
+              <a:t>3/15/15</a:t>
             </a:fld>
             <a:endParaRPr lang="en-US"/>
           </a:p>
@@ -2958,7 +2959,7 @@
           <a:p>
             <a:fld id="{F382D2B8-5B0C-E947-8C66-90157F7E06E9}" type="datetimeFigureOut">
               <a:rPr lang="en-US" smtClean="0"/>
-              <a:t>3/2/15</a:t>
+              <a:t>3/15/15</a:t>
             </a:fld>
             <a:endParaRPr lang="en-US"/>
           </a:p>
@@ -3171,7 +3172,7 @@
           <a:p>
             <a:fld id="{F382D2B8-5B0C-E947-8C66-90157F7E06E9}" type="datetimeFigureOut">
               <a:rPr lang="en-US" smtClean="0"/>
-              <a:t>3/2/15</a:t>
+              <a:t>3/15/15</a:t>
             </a:fld>
             <a:endParaRPr lang="en-US"/>
           </a:p>
@@ -3606,6 +3607,198 @@
           <a:chExt cx="0" cy="0"/>
         </a:xfrm>
       </p:grpSpPr>
+      <p:sp>
+        <p:nvSpPr>
+          <p:cNvPr id="4" name="Oval 3"/>
+          <p:cNvSpPr/>
+          <p:nvPr/>
+        </p:nvSpPr>
+        <p:spPr>
+          <a:xfrm>
+            <a:off x="4693708" y="4086454"/>
+            <a:ext cx="1534657" cy="1340728"/>
+          </a:xfrm>
+          <a:prstGeom prst="ellipse">
+            <a:avLst/>
+          </a:prstGeom>
+        </p:spPr>
+        <p:style>
+          <a:lnRef idx="2">
+            <a:schemeClr val="dk1"/>
+          </a:lnRef>
+          <a:fillRef idx="1">
+            <a:schemeClr val="lt1"/>
+          </a:fillRef>
+          <a:effectRef idx="0">
+            <a:schemeClr val="dk1"/>
+          </a:effectRef>
+          <a:fontRef idx="minor">
+            <a:schemeClr val="dk1"/>
+          </a:fontRef>
+        </p:style>
+        <p:txBody>
+          <a:bodyPr rtlCol="0" anchor="ctr"/>
+          <a:lstStyle/>
+          <a:p>
+            <a:pPr algn="ctr"/>
+            <a:endParaRPr lang="en-US"/>
+          </a:p>
+        </p:txBody>
+      </p:sp>
+      <p:sp>
+        <p:nvSpPr>
+          <p:cNvPr id="5" name="Right Arrow 4"/>
+          <p:cNvSpPr/>
+          <p:nvPr/>
+        </p:nvSpPr>
+        <p:spPr>
+          <a:xfrm rot="5400000">
+            <a:off x="4884330" y="3514366"/>
+            <a:ext cx="967522" cy="176657"/>
+          </a:xfrm>
+          <a:prstGeom prst="rightArrow">
+            <a:avLst/>
+          </a:prstGeom>
+        </p:spPr>
+        <p:style>
+          <a:lnRef idx="1">
+            <a:schemeClr val="dk1"/>
+          </a:lnRef>
+          <a:fillRef idx="3">
+            <a:schemeClr val="dk1"/>
+          </a:fillRef>
+          <a:effectRef idx="2">
+            <a:schemeClr val="dk1"/>
+          </a:effectRef>
+          <a:fontRef idx="minor">
+            <a:schemeClr val="lt1"/>
+          </a:fontRef>
+        </p:style>
+        <p:txBody>
+          <a:bodyPr rtlCol="0" anchor="ctr"/>
+          <a:lstStyle/>
+          <a:p>
+            <a:pPr algn="ctr"/>
+            <a:endParaRPr lang="en-US"/>
+          </a:p>
+        </p:txBody>
+      </p:sp>
+      <p:sp>
+        <p:nvSpPr>
+          <p:cNvPr id="6" name="Oval 5"/>
+          <p:cNvSpPr/>
+          <p:nvPr/>
+        </p:nvSpPr>
+        <p:spPr>
+          <a:xfrm>
+            <a:off x="4663498" y="1712715"/>
+            <a:ext cx="1534657" cy="1340728"/>
+          </a:xfrm>
+          <a:prstGeom prst="ellipse">
+            <a:avLst/>
+          </a:prstGeom>
+        </p:spPr>
+        <p:style>
+          <a:lnRef idx="2">
+            <a:schemeClr val="dk1"/>
+          </a:lnRef>
+          <a:fillRef idx="1">
+            <a:schemeClr val="lt1"/>
+          </a:fillRef>
+          <a:effectRef idx="0">
+            <a:schemeClr val="dk1"/>
+          </a:effectRef>
+          <a:fontRef idx="minor">
+            <a:schemeClr val="dk1"/>
+          </a:fontRef>
+        </p:style>
+        <p:txBody>
+          <a:bodyPr rtlCol="0" anchor="ctr"/>
+          <a:lstStyle/>
+          <a:p>
+            <a:pPr algn="ctr"/>
+            <a:endParaRPr lang="en-US"/>
+          </a:p>
+        </p:txBody>
+      </p:sp>
+      <p:pic>
+        <p:nvPicPr>
+          <p:cNvPr id="8" name="Picture 7"/>
+          <p:cNvPicPr>
+            <a:picLocks noChangeAspect="1"/>
+          </p:cNvPicPr>
+          <p:nvPr/>
+        </p:nvPicPr>
+        <p:blipFill>
+          <a:blip r:embed="rId2"/>
+          <a:stretch>
+            <a:fillRect/>
+          </a:stretch>
+        </p:blipFill>
+        <p:spPr>
+          <a:xfrm>
+            <a:off x="4741178" y="4500593"/>
+            <a:ext cx="1356655" cy="469900"/>
+          </a:xfrm>
+          <a:prstGeom prst="rect">
+            <a:avLst/>
+          </a:prstGeom>
+        </p:spPr>
+      </p:pic>
+      <p:pic>
+        <p:nvPicPr>
+          <p:cNvPr id="9" name="Picture 8"/>
+          <p:cNvPicPr>
+            <a:picLocks noChangeAspect="1"/>
+          </p:cNvPicPr>
+          <p:nvPr/>
+        </p:nvPicPr>
+        <p:blipFill>
+          <a:blip r:embed="rId3"/>
+          <a:stretch>
+            <a:fillRect/>
+          </a:stretch>
+        </p:blipFill>
+        <p:spPr>
+          <a:xfrm>
+            <a:off x="5180451" y="2048783"/>
+            <a:ext cx="440097" cy="691581"/>
+          </a:xfrm>
+          <a:prstGeom prst="rect">
+            <a:avLst/>
+          </a:prstGeom>
+        </p:spPr>
+      </p:pic>
+    </p:spTree>
+    <p:extLst>
+      <p:ext uri="{BB962C8B-B14F-4D97-AF65-F5344CB8AC3E}">
+        <p14:creationId xmlns:p14="http://schemas.microsoft.com/office/powerpoint/2010/main" val="2445036075"/>
+      </p:ext>
+    </p:extLst>
+  </p:cSld>
+  <p:clrMapOvr>
+    <a:masterClrMapping/>
+  </p:clrMapOvr>
+</p:sld>
+</file>
+
+<file path=ppt/slides/slide11.xml><?xml version="1.0" encoding="utf-8"?>
+<p:sld xmlns:a="http://schemas.openxmlformats.org/drawingml/2006/main" xmlns:r="http://schemas.openxmlformats.org/officeDocument/2006/relationships" xmlns:p="http://schemas.openxmlformats.org/presentationml/2006/main">
+  <p:cSld>
+    <p:spTree>
+      <p:nvGrpSpPr>
+        <p:cNvPr id="1" name=""/>
+        <p:cNvGrpSpPr/>
+        <p:nvPr/>
+      </p:nvGrpSpPr>
+      <p:grpSpPr>
+        <a:xfrm>
+          <a:off x="0" y="0"/>
+          <a:ext cx="0" cy="0"/>
+          <a:chOff x="0" y="0"/>
+          <a:chExt cx="0" cy="0"/>
+        </a:xfrm>
+      </p:grpSpPr>
       <p:pic>
         <p:nvPicPr>
           <p:cNvPr id="155" name="Picture 154" descr="marker_gpis.eps"/>
@@ -4627,7 +4820,7 @@
 </p:sld>
 </file>
 
-<file path=ppt/slides/slide11.xml><?xml version="1.0" encoding="utf-8"?>
+<file path=ppt/slides/slide12.xml><?xml version="1.0" encoding="utf-8"?>
 <p:sld xmlns:a="http://schemas.openxmlformats.org/drawingml/2006/main" xmlns:r="http://schemas.openxmlformats.org/officeDocument/2006/relationships" xmlns:p="http://schemas.openxmlformats.org/presentationml/2006/main">
   <p:cSld>
     <p:spTree>
@@ -6349,123 +6542,903 @@
           <a:chExt cx="0" cy="0"/>
         </a:xfrm>
       </p:grpSpPr>
-      <p:sp>
-        <p:nvSpPr>
-          <p:cNvPr id="4" name="Oval 3"/>
-          <p:cNvSpPr/>
-          <p:nvPr/>
-        </p:nvSpPr>
-        <p:spPr>
-          <a:xfrm>
-            <a:off x="4693708" y="4086454"/>
-            <a:ext cx="1534657" cy="1340728"/>
-          </a:xfrm>
-          <a:prstGeom prst="ellipse">
-            <a:avLst/>
-          </a:prstGeom>
+      <p:grpSp>
+        <p:nvGrpSpPr>
+          <p:cNvPr id="2" name="Group 1"/>
+          <p:cNvGrpSpPr/>
+          <p:nvPr/>
+        </p:nvGrpSpPr>
+        <p:grpSpPr>
+          <a:xfrm>
+            <a:off x="2378650" y="511572"/>
+            <a:ext cx="1548764" cy="1226773"/>
+            <a:chOff x="3846304" y="182334"/>
+            <a:chExt cx="1548764" cy="1226773"/>
+          </a:xfrm>
+        </p:grpSpPr>
+        <p:sp>
+          <p:nvSpPr>
+            <p:cNvPr id="48" name="Oval 47"/>
+            <p:cNvSpPr/>
+            <p:nvPr/>
+          </p:nvSpPr>
+          <p:spPr>
+            <a:xfrm>
+              <a:off x="3969784" y="182334"/>
+              <a:ext cx="1331800" cy="1226773"/>
+            </a:xfrm>
+            <a:prstGeom prst="ellipse">
+              <a:avLst/>
+            </a:prstGeom>
+          </p:spPr>
+          <p:style>
+            <a:lnRef idx="2">
+              <a:schemeClr val="dk1"/>
+            </a:lnRef>
+            <a:fillRef idx="1">
+              <a:schemeClr val="lt1"/>
+            </a:fillRef>
+            <a:effectRef idx="0">
+              <a:schemeClr val="dk1"/>
+            </a:effectRef>
+            <a:fontRef idx="minor">
+              <a:schemeClr val="dk1"/>
+            </a:fontRef>
+          </p:style>
+          <p:txBody>
+            <a:bodyPr rtlCol="0" anchor="ctr"/>
+            <a:lstStyle/>
+            <a:p>
+              <a:pPr algn="ctr"/>
+              <a:endParaRPr lang="en-US" dirty="0"/>
+            </a:p>
+          </p:txBody>
+        </p:sp>
+        <p:sp>
+          <p:nvSpPr>
+            <p:cNvPr id="26" name="TextBox 25"/>
+            <p:cNvSpPr txBox="1"/>
+            <p:nvPr/>
+          </p:nvSpPr>
+          <p:spPr>
+            <a:xfrm>
+              <a:off x="3846304" y="523281"/>
+              <a:ext cx="1548764" cy="461665"/>
+            </a:xfrm>
+            <a:prstGeom prst="rect">
+              <a:avLst/>
+            </a:prstGeom>
+            <a:noFill/>
+          </p:spPr>
+          <p:txBody>
+            <a:bodyPr wrap="square" rtlCol="0">
+              <a:spAutoFit/>
+            </a:bodyPr>
+            <a:lstStyle/>
+            <a:p>
+              <a:pPr algn="ctr"/>
+              <a:r>
+                <a:rPr lang="en-US" sz="2400" dirty="0" smtClean="0"/>
+                <a:t> </a:t>
+              </a:r>
+              <a:r>
+                <a:rPr lang="en-US" sz="2400" dirty="0" smtClean="0"/>
+                <a:t>Approach</a:t>
+              </a:r>
+              <a:endParaRPr lang="en-US" dirty="0"/>
+            </a:p>
+          </p:txBody>
+        </p:sp>
+      </p:grpSp>
+      <p:grpSp>
+        <p:nvGrpSpPr>
+          <p:cNvPr id="37" name="Group 36"/>
+          <p:cNvGrpSpPr/>
+          <p:nvPr/>
+        </p:nvGrpSpPr>
+        <p:grpSpPr>
+          <a:xfrm>
+            <a:off x="4376519" y="511572"/>
+            <a:ext cx="1548764" cy="1226773"/>
+            <a:chOff x="3828664" y="182334"/>
+            <a:chExt cx="1548764" cy="1226773"/>
+          </a:xfrm>
+        </p:grpSpPr>
+        <p:sp>
+          <p:nvSpPr>
+            <p:cNvPr id="40" name="Oval 39"/>
+            <p:cNvSpPr/>
+            <p:nvPr/>
+          </p:nvSpPr>
+          <p:spPr>
+            <a:xfrm>
+              <a:off x="3969784" y="182334"/>
+              <a:ext cx="1331800" cy="1226773"/>
+            </a:xfrm>
+            <a:prstGeom prst="ellipse">
+              <a:avLst/>
+            </a:prstGeom>
+          </p:spPr>
+          <p:style>
+            <a:lnRef idx="2">
+              <a:schemeClr val="dk1"/>
+            </a:lnRef>
+            <a:fillRef idx="1">
+              <a:schemeClr val="lt1"/>
+            </a:fillRef>
+            <a:effectRef idx="0">
+              <a:schemeClr val="dk1"/>
+            </a:effectRef>
+            <a:fontRef idx="minor">
+              <a:schemeClr val="dk1"/>
+            </a:fontRef>
+          </p:style>
+          <p:txBody>
+            <a:bodyPr rtlCol="0" anchor="ctr"/>
+            <a:lstStyle/>
+            <a:p>
+              <a:pPr algn="ctr"/>
+              <a:endParaRPr lang="en-US" dirty="0"/>
+            </a:p>
+          </p:txBody>
+        </p:sp>
+        <p:sp>
+          <p:nvSpPr>
+            <p:cNvPr id="42" name="TextBox 41"/>
+            <p:cNvSpPr txBox="1"/>
+            <p:nvPr/>
+          </p:nvSpPr>
+          <p:spPr>
+            <a:xfrm>
+              <a:off x="3828664" y="523281"/>
+              <a:ext cx="1548764" cy="461665"/>
+            </a:xfrm>
+            <a:prstGeom prst="rect">
+              <a:avLst/>
+            </a:prstGeom>
+            <a:noFill/>
+          </p:spPr>
+          <p:txBody>
+            <a:bodyPr wrap="square" rtlCol="0">
+              <a:spAutoFit/>
+            </a:bodyPr>
+            <a:lstStyle/>
+            <a:p>
+              <a:pPr algn="ctr"/>
+              <a:r>
+                <a:rPr lang="en-US" sz="2400" dirty="0" smtClean="0"/>
+                <a:t> </a:t>
+              </a:r>
+              <a:r>
+                <a:rPr lang="en-US" sz="2400" dirty="0" smtClean="0"/>
+                <a:t>Shape</a:t>
+              </a:r>
+              <a:endParaRPr lang="en-US" dirty="0"/>
+            </a:p>
+          </p:txBody>
+        </p:sp>
+      </p:grpSp>
+      <p:grpSp>
+        <p:nvGrpSpPr>
+          <p:cNvPr id="43" name="Group 42"/>
+          <p:cNvGrpSpPr/>
+          <p:nvPr/>
+        </p:nvGrpSpPr>
+        <p:grpSpPr>
+          <a:xfrm>
+            <a:off x="1408119" y="2436565"/>
+            <a:ext cx="1548764" cy="1226773"/>
+            <a:chOff x="3828664" y="182334"/>
+            <a:chExt cx="1548764" cy="1226773"/>
+          </a:xfrm>
+        </p:grpSpPr>
+        <p:sp>
+          <p:nvSpPr>
+            <p:cNvPr id="44" name="Oval 43"/>
+            <p:cNvSpPr/>
+            <p:nvPr/>
+          </p:nvSpPr>
+          <p:spPr>
+            <a:xfrm>
+              <a:off x="3969784" y="182334"/>
+              <a:ext cx="1331800" cy="1226773"/>
+            </a:xfrm>
+            <a:prstGeom prst="ellipse">
+              <a:avLst/>
+            </a:prstGeom>
+          </p:spPr>
+          <p:style>
+            <a:lnRef idx="2">
+              <a:schemeClr val="dk1"/>
+            </a:lnRef>
+            <a:fillRef idx="1">
+              <a:schemeClr val="lt1"/>
+            </a:fillRef>
+            <a:effectRef idx="0">
+              <a:schemeClr val="dk1"/>
+            </a:effectRef>
+            <a:fontRef idx="minor">
+              <a:schemeClr val="dk1"/>
+            </a:fontRef>
+          </p:style>
+          <p:txBody>
+            <a:bodyPr rtlCol="0" anchor="ctr"/>
+            <a:lstStyle/>
+            <a:p>
+              <a:pPr algn="ctr"/>
+              <a:endParaRPr lang="en-US" dirty="0"/>
+            </a:p>
+          </p:txBody>
+        </p:sp>
+        <p:sp>
+          <p:nvSpPr>
+            <p:cNvPr id="45" name="TextBox 44"/>
+            <p:cNvSpPr txBox="1"/>
+            <p:nvPr/>
+          </p:nvSpPr>
+          <p:spPr>
+            <a:xfrm>
+              <a:off x="3828664" y="523281"/>
+              <a:ext cx="1548764" cy="461665"/>
+            </a:xfrm>
+            <a:prstGeom prst="rect">
+              <a:avLst/>
+            </a:prstGeom>
+            <a:noFill/>
+          </p:spPr>
+          <p:txBody>
+            <a:bodyPr wrap="square" rtlCol="0">
+              <a:spAutoFit/>
+            </a:bodyPr>
+            <a:lstStyle/>
+            <a:p>
+              <a:pPr algn="ctr"/>
+              <a:r>
+                <a:rPr lang="en-US" sz="2400" dirty="0" smtClean="0"/>
+                <a:t> </a:t>
+              </a:r>
+              <a:r>
+                <a:rPr lang="en-US" sz="2400" dirty="0" smtClean="0"/>
+                <a:t>Contacts</a:t>
+              </a:r>
+              <a:endParaRPr lang="en-US" dirty="0"/>
+            </a:p>
+          </p:txBody>
+        </p:sp>
+      </p:grpSp>
+      <p:grpSp>
+        <p:nvGrpSpPr>
+          <p:cNvPr id="46" name="Group 45"/>
+          <p:cNvGrpSpPr/>
+          <p:nvPr/>
+        </p:nvGrpSpPr>
+        <p:grpSpPr>
+          <a:xfrm>
+            <a:off x="6653118" y="2436565"/>
+            <a:ext cx="1548764" cy="1226773"/>
+            <a:chOff x="3828664" y="182334"/>
+            <a:chExt cx="1548764" cy="1226773"/>
+          </a:xfrm>
+        </p:grpSpPr>
+        <p:sp>
+          <p:nvSpPr>
+            <p:cNvPr id="51" name="Oval 50"/>
+            <p:cNvSpPr/>
+            <p:nvPr/>
+          </p:nvSpPr>
+          <p:spPr>
+            <a:xfrm>
+              <a:off x="3969784" y="182334"/>
+              <a:ext cx="1331800" cy="1226773"/>
+            </a:xfrm>
+            <a:prstGeom prst="ellipse">
+              <a:avLst/>
+            </a:prstGeom>
+          </p:spPr>
+          <p:style>
+            <a:lnRef idx="2">
+              <a:schemeClr val="dk1"/>
+            </a:lnRef>
+            <a:fillRef idx="1">
+              <a:schemeClr val="lt1"/>
+            </a:fillRef>
+            <a:effectRef idx="0">
+              <a:schemeClr val="dk1"/>
+            </a:effectRef>
+            <a:fontRef idx="minor">
+              <a:schemeClr val="dk1"/>
+            </a:fontRef>
+          </p:style>
+          <p:txBody>
+            <a:bodyPr rtlCol="0" anchor="ctr"/>
+            <a:lstStyle/>
+            <a:p>
+              <a:pPr algn="ctr"/>
+              <a:endParaRPr lang="en-US" dirty="0"/>
+            </a:p>
+          </p:txBody>
+        </p:sp>
+        <p:sp>
+          <p:nvSpPr>
+            <p:cNvPr id="52" name="TextBox 51"/>
+            <p:cNvSpPr txBox="1"/>
+            <p:nvPr/>
+          </p:nvSpPr>
+          <p:spPr>
+            <a:xfrm>
+              <a:off x="3828664" y="523281"/>
+              <a:ext cx="1548764" cy="461665"/>
+            </a:xfrm>
+            <a:prstGeom prst="rect">
+              <a:avLst/>
+            </a:prstGeom>
+            <a:noFill/>
+          </p:spPr>
+          <p:txBody>
+            <a:bodyPr wrap="square" rtlCol="0">
+              <a:spAutoFit/>
+            </a:bodyPr>
+            <a:lstStyle/>
+            <a:p>
+              <a:pPr algn="ctr"/>
+              <a:r>
+                <a:rPr lang="en-US" sz="2400" dirty="0" smtClean="0"/>
+                <a:t> </a:t>
+              </a:r>
+              <a:r>
+                <a:rPr lang="en-US" sz="2400" dirty="0" smtClean="0"/>
+                <a:t>Friction</a:t>
+              </a:r>
+              <a:endParaRPr lang="en-US" dirty="0"/>
+            </a:p>
+          </p:txBody>
+        </p:sp>
+      </p:grpSp>
+      <p:grpSp>
+        <p:nvGrpSpPr>
+          <p:cNvPr id="53" name="Group 52"/>
+          <p:cNvGrpSpPr/>
+          <p:nvPr/>
+        </p:nvGrpSpPr>
+        <p:grpSpPr>
+          <a:xfrm>
+            <a:off x="4376519" y="2436565"/>
+            <a:ext cx="1548764" cy="1226773"/>
+            <a:chOff x="3828664" y="182334"/>
+            <a:chExt cx="1548764" cy="1226773"/>
+          </a:xfrm>
+        </p:grpSpPr>
+        <p:sp>
+          <p:nvSpPr>
+            <p:cNvPr id="54" name="Oval 53"/>
+            <p:cNvSpPr/>
+            <p:nvPr/>
+          </p:nvSpPr>
+          <p:spPr>
+            <a:xfrm>
+              <a:off x="3969784" y="182334"/>
+              <a:ext cx="1331800" cy="1226773"/>
+            </a:xfrm>
+            <a:prstGeom prst="ellipse">
+              <a:avLst/>
+            </a:prstGeom>
+          </p:spPr>
+          <p:style>
+            <a:lnRef idx="2">
+              <a:schemeClr val="dk1"/>
+            </a:lnRef>
+            <a:fillRef idx="1">
+              <a:schemeClr val="lt1"/>
+            </a:fillRef>
+            <a:effectRef idx="0">
+              <a:schemeClr val="dk1"/>
+            </a:effectRef>
+            <a:fontRef idx="minor">
+              <a:schemeClr val="dk1"/>
+            </a:fontRef>
+          </p:style>
+          <p:txBody>
+            <a:bodyPr rtlCol="0" anchor="ctr"/>
+            <a:lstStyle/>
+            <a:p>
+              <a:pPr algn="ctr"/>
+              <a:endParaRPr lang="en-US" dirty="0"/>
+            </a:p>
+          </p:txBody>
+        </p:sp>
+        <p:sp>
+          <p:nvSpPr>
+            <p:cNvPr id="55" name="TextBox 54"/>
+            <p:cNvSpPr txBox="1"/>
+            <p:nvPr/>
+          </p:nvSpPr>
+          <p:spPr>
+            <a:xfrm>
+              <a:off x="3828664" y="523281"/>
+              <a:ext cx="1548764" cy="461665"/>
+            </a:xfrm>
+            <a:prstGeom prst="rect">
+              <a:avLst/>
+            </a:prstGeom>
+            <a:noFill/>
+          </p:spPr>
+          <p:txBody>
+            <a:bodyPr wrap="square" rtlCol="0">
+              <a:spAutoFit/>
+            </a:bodyPr>
+            <a:lstStyle/>
+            <a:p>
+              <a:pPr algn="ctr"/>
+              <a:r>
+                <a:rPr lang="en-US" sz="2400" dirty="0" smtClean="0"/>
+                <a:t> </a:t>
+              </a:r>
+              <a:r>
+                <a:rPr lang="en-US" sz="2400" dirty="0" err="1" smtClean="0"/>
+                <a:t>Normals</a:t>
+              </a:r>
+              <a:endParaRPr lang="en-US" dirty="0"/>
+            </a:p>
+          </p:txBody>
+        </p:sp>
+      </p:grpSp>
+      <p:grpSp>
+        <p:nvGrpSpPr>
+          <p:cNvPr id="56" name="Group 55"/>
+          <p:cNvGrpSpPr/>
+          <p:nvPr/>
+        </p:nvGrpSpPr>
+        <p:grpSpPr>
+          <a:xfrm>
+            <a:off x="496137" y="511572"/>
+            <a:ext cx="1548764" cy="1226773"/>
+            <a:chOff x="3828664" y="182334"/>
+            <a:chExt cx="1548764" cy="1226773"/>
+          </a:xfrm>
+        </p:grpSpPr>
+        <p:sp>
+          <p:nvSpPr>
+            <p:cNvPr id="57" name="Oval 56"/>
+            <p:cNvSpPr/>
+            <p:nvPr/>
+          </p:nvSpPr>
+          <p:spPr>
+            <a:xfrm>
+              <a:off x="3969784" y="182334"/>
+              <a:ext cx="1331800" cy="1226773"/>
+            </a:xfrm>
+            <a:prstGeom prst="ellipse">
+              <a:avLst/>
+            </a:prstGeom>
+          </p:spPr>
+          <p:style>
+            <a:lnRef idx="2">
+              <a:schemeClr val="dk1"/>
+            </a:lnRef>
+            <a:fillRef idx="1">
+              <a:schemeClr val="lt1"/>
+            </a:fillRef>
+            <a:effectRef idx="0">
+              <a:schemeClr val="dk1"/>
+            </a:effectRef>
+            <a:fontRef idx="minor">
+              <a:schemeClr val="dk1"/>
+            </a:fontRef>
+          </p:style>
+          <p:txBody>
+            <a:bodyPr rtlCol="0" anchor="ctr"/>
+            <a:lstStyle/>
+            <a:p>
+              <a:pPr algn="ctr"/>
+              <a:endParaRPr lang="en-US" dirty="0"/>
+            </a:p>
+          </p:txBody>
+        </p:sp>
+        <p:sp>
+          <p:nvSpPr>
+            <p:cNvPr id="58" name="TextBox 57"/>
+            <p:cNvSpPr txBox="1"/>
+            <p:nvPr/>
+          </p:nvSpPr>
+          <p:spPr>
+            <a:xfrm>
+              <a:off x="3828664" y="523281"/>
+              <a:ext cx="1548764" cy="461665"/>
+            </a:xfrm>
+            <a:prstGeom prst="rect">
+              <a:avLst/>
+            </a:prstGeom>
+            <a:noFill/>
+          </p:spPr>
+          <p:txBody>
+            <a:bodyPr wrap="square" rtlCol="0">
+              <a:spAutoFit/>
+            </a:bodyPr>
+            <a:lstStyle/>
+            <a:p>
+              <a:pPr algn="ctr"/>
+              <a:r>
+                <a:rPr lang="en-US" sz="2400" dirty="0" smtClean="0"/>
+                <a:t> </a:t>
+              </a:r>
+              <a:r>
+                <a:rPr lang="en-US" sz="2400" dirty="0" smtClean="0"/>
+                <a:t>Pose</a:t>
+              </a:r>
+              <a:endParaRPr lang="en-US" dirty="0"/>
+            </a:p>
+          </p:txBody>
+        </p:sp>
+      </p:grpSp>
+      <p:grpSp>
+        <p:nvGrpSpPr>
+          <p:cNvPr id="59" name="Group 58"/>
+          <p:cNvGrpSpPr/>
+          <p:nvPr/>
+        </p:nvGrpSpPr>
+        <p:grpSpPr>
+          <a:xfrm>
+            <a:off x="4376519" y="4257055"/>
+            <a:ext cx="1548764" cy="1226773"/>
+            <a:chOff x="3828664" y="182334"/>
+            <a:chExt cx="1548764" cy="1226773"/>
+          </a:xfrm>
+        </p:grpSpPr>
+        <p:sp>
+          <p:nvSpPr>
+            <p:cNvPr id="60" name="Oval 59"/>
+            <p:cNvSpPr/>
+            <p:nvPr/>
+          </p:nvSpPr>
+          <p:spPr>
+            <a:xfrm>
+              <a:off x="3969784" y="182334"/>
+              <a:ext cx="1331800" cy="1226773"/>
+            </a:xfrm>
+            <a:prstGeom prst="ellipse">
+              <a:avLst/>
+            </a:prstGeom>
+            <a:ln w="101600" cmpd="sng"/>
+          </p:spPr>
+          <p:style>
+            <a:lnRef idx="2">
+              <a:schemeClr val="dk1"/>
+            </a:lnRef>
+            <a:fillRef idx="1">
+              <a:schemeClr val="lt1"/>
+            </a:fillRef>
+            <a:effectRef idx="0">
+              <a:schemeClr val="dk1"/>
+            </a:effectRef>
+            <a:fontRef idx="minor">
+              <a:schemeClr val="dk1"/>
+            </a:fontRef>
+          </p:style>
+          <p:txBody>
+            <a:bodyPr rtlCol="0" anchor="ctr"/>
+            <a:lstStyle/>
+            <a:p>
+              <a:pPr algn="ctr"/>
+              <a:endParaRPr lang="en-US" dirty="0"/>
+            </a:p>
+          </p:txBody>
+        </p:sp>
+        <p:sp>
+          <p:nvSpPr>
+            <p:cNvPr id="61" name="TextBox 60"/>
+            <p:cNvSpPr txBox="1"/>
+            <p:nvPr/>
+          </p:nvSpPr>
+          <p:spPr>
+            <a:xfrm>
+              <a:off x="3828664" y="452717"/>
+              <a:ext cx="1548764" cy="461665"/>
+            </a:xfrm>
+            <a:prstGeom prst="rect">
+              <a:avLst/>
+            </a:prstGeom>
+            <a:noFill/>
+          </p:spPr>
+          <p:txBody>
+            <a:bodyPr wrap="square" rtlCol="0">
+              <a:spAutoFit/>
+            </a:bodyPr>
+            <a:lstStyle/>
+            <a:p>
+              <a:pPr algn="ctr"/>
+              <a:r>
+                <a:rPr lang="en-US" sz="2400" dirty="0" smtClean="0"/>
+                <a:t> </a:t>
+              </a:r>
+              <a:r>
+                <a:rPr lang="en-US" sz="2400" dirty="0" smtClean="0"/>
+                <a:t>Quality</a:t>
+              </a:r>
+              <a:endParaRPr lang="en-US" dirty="0"/>
+            </a:p>
+          </p:txBody>
+        </p:sp>
+      </p:grpSp>
+      <p:cxnSp>
+        <p:nvCxnSpPr>
+          <p:cNvPr id="4" name="Straight Arrow Connector 3"/>
+          <p:cNvCxnSpPr>
+            <a:stCxn id="57" idx="4"/>
+            <a:endCxn id="44" idx="1"/>
+          </p:cNvCxnSpPr>
+          <p:nvPr/>
+        </p:nvCxnSpPr>
+        <p:spPr>
+          <a:xfrm>
+            <a:off x="1303157" y="1738345"/>
+            <a:ext cx="441120" cy="877877"/>
+          </a:xfrm>
+          <a:prstGeom prst="straightConnector1">
+            <a:avLst/>
+          </a:prstGeom>
+          <a:ln w="88900">
+            <a:solidFill>
+              <a:schemeClr val="tx1"/>
+            </a:solidFill>
+            <a:tailEnd type="triangle" w="med" len="med"/>
+          </a:ln>
+          <a:effectLst/>
         </p:spPr>
         <p:style>
           <a:lnRef idx="2">
-            <a:schemeClr val="dk1"/>
+            <a:schemeClr val="accent1"/>
           </a:lnRef>
-          <a:fillRef idx="1">
-            <a:schemeClr val="lt1"/>
+          <a:fillRef idx="0">
+            <a:schemeClr val="accent1"/>
           </a:fillRef>
-          <a:effectRef idx="0">
-            <a:schemeClr val="dk1"/>
+          <a:effectRef idx="1">
+            <a:schemeClr val="accent1"/>
           </a:effectRef>
           <a:fontRef idx="minor">
-            <a:schemeClr val="dk1"/>
+            <a:schemeClr val="tx1"/>
           </a:fontRef>
         </p:style>
-        <p:txBody>
-          <a:bodyPr rtlCol="0" anchor="ctr"/>
-          <a:lstStyle/>
-          <a:p>
-            <a:pPr algn="ctr"/>
-            <a:endParaRPr lang="en-US"/>
-          </a:p>
-        </p:txBody>
-      </p:sp>
-      <p:sp>
-        <p:nvSpPr>
-          <p:cNvPr id="5" name="Right Arrow 4"/>
-          <p:cNvSpPr/>
-          <p:nvPr/>
-        </p:nvSpPr>
-        <p:spPr>
-          <a:xfrm rot="5400000">
-            <a:off x="4884330" y="3514366"/>
-            <a:ext cx="967522" cy="176657"/>
-          </a:xfrm>
-          <a:prstGeom prst="rightArrow">
-            <a:avLst/>
-          </a:prstGeom>
+      </p:cxnSp>
+      <p:cxnSp>
+        <p:nvCxnSpPr>
+          <p:cNvPr id="63" name="Straight Arrow Connector 62"/>
+          <p:cNvCxnSpPr>
+            <a:stCxn id="48" idx="4"/>
+            <a:endCxn id="44" idx="7"/>
+          </p:cNvCxnSpPr>
+          <p:nvPr/>
+        </p:nvCxnSpPr>
+        <p:spPr>
+          <a:xfrm flipH="1">
+            <a:off x="2686001" y="1738345"/>
+            <a:ext cx="482029" cy="877877"/>
+          </a:xfrm>
+          <a:prstGeom prst="straightConnector1">
+            <a:avLst/>
+          </a:prstGeom>
+          <a:ln w="88900">
+            <a:solidFill>
+              <a:schemeClr val="tx1"/>
+            </a:solidFill>
+            <a:tailEnd type="triangle" w="med" len="med"/>
+          </a:ln>
+          <a:effectLst/>
         </p:spPr>
         <p:style>
-          <a:lnRef idx="1">
-            <a:schemeClr val="dk1"/>
+          <a:lnRef idx="2">
+            <a:schemeClr val="accent1"/>
           </a:lnRef>
-          <a:fillRef idx="3">
-            <a:schemeClr val="dk1"/>
+          <a:fillRef idx="0">
+            <a:schemeClr val="accent1"/>
           </a:fillRef>
-          <a:effectRef idx="2">
-            <a:schemeClr val="dk1"/>
+          <a:effectRef idx="1">
+            <a:schemeClr val="accent1"/>
           </a:effectRef>
           <a:fontRef idx="minor">
-            <a:schemeClr val="lt1"/>
+            <a:schemeClr val="tx1"/>
           </a:fontRef>
         </p:style>
-        <p:txBody>
-          <a:bodyPr rtlCol="0" anchor="ctr"/>
-          <a:lstStyle/>
-          <a:p>
-            <a:pPr algn="ctr"/>
-            <a:endParaRPr lang="en-US"/>
-          </a:p>
-        </p:txBody>
-      </p:sp>
-      <p:sp>
-        <p:nvSpPr>
-          <p:cNvPr id="6" name="Oval 5"/>
-          <p:cNvSpPr/>
-          <p:nvPr/>
-        </p:nvSpPr>
-        <p:spPr>
-          <a:xfrm>
-            <a:off x="4663498" y="1712715"/>
-            <a:ext cx="1534657" cy="1340728"/>
-          </a:xfrm>
-          <a:prstGeom prst="ellipse">
-            <a:avLst/>
-          </a:prstGeom>
+      </p:cxnSp>
+      <p:cxnSp>
+        <p:nvCxnSpPr>
+          <p:cNvPr id="65" name="Straight Arrow Connector 64"/>
+          <p:cNvCxnSpPr/>
+          <p:nvPr/>
+        </p:nvCxnSpPr>
+        <p:spPr>
+          <a:xfrm>
+            <a:off x="2881039" y="3008345"/>
+            <a:ext cx="1636600" cy="0"/>
+          </a:xfrm>
+          <a:prstGeom prst="straightConnector1">
+            <a:avLst/>
+          </a:prstGeom>
+          <a:ln w="88900">
+            <a:solidFill>
+              <a:schemeClr val="tx1"/>
+            </a:solidFill>
+            <a:tailEnd type="triangle" w="med" len="med"/>
+          </a:ln>
+          <a:effectLst/>
         </p:spPr>
         <p:style>
           <a:lnRef idx="2">
-            <a:schemeClr val="dk1"/>
+            <a:schemeClr val="accent1"/>
           </a:lnRef>
-          <a:fillRef idx="1">
-            <a:schemeClr val="lt1"/>
+          <a:fillRef idx="0">
+            <a:schemeClr val="accent1"/>
           </a:fillRef>
-          <a:effectRef idx="0">
-            <a:schemeClr val="dk1"/>
+          <a:effectRef idx="1">
+            <a:schemeClr val="accent1"/>
           </a:effectRef>
           <a:fontRef idx="minor">
-            <a:schemeClr val="dk1"/>
+            <a:schemeClr val="tx1"/>
           </a:fontRef>
         </p:style>
-        <p:txBody>
-          <a:bodyPr rtlCol="0" anchor="ctr"/>
-          <a:lstStyle/>
-          <a:p>
-            <a:pPr algn="ctr"/>
-            <a:endParaRPr lang="en-US"/>
-          </a:p>
-        </p:txBody>
-      </p:sp>
+      </p:cxnSp>
+      <p:cxnSp>
+        <p:nvCxnSpPr>
+          <p:cNvPr id="72" name="Straight Arrow Connector 71"/>
+          <p:cNvCxnSpPr>
+            <a:stCxn id="44" idx="5"/>
+            <a:endCxn id="60" idx="1"/>
+          </p:cNvCxnSpPr>
+          <p:nvPr/>
+        </p:nvCxnSpPr>
+        <p:spPr>
+          <a:xfrm>
+            <a:off x="2686001" y="3483681"/>
+            <a:ext cx="2026676" cy="953031"/>
+          </a:xfrm>
+          <a:prstGeom prst="straightConnector1">
+            <a:avLst/>
+          </a:prstGeom>
+          <a:ln w="88900">
+            <a:solidFill>
+              <a:schemeClr val="tx1"/>
+            </a:solidFill>
+            <a:tailEnd type="triangle" w="med" len="med"/>
+          </a:ln>
+          <a:effectLst/>
+        </p:spPr>
+        <p:style>
+          <a:lnRef idx="2">
+            <a:schemeClr val="accent1"/>
+          </a:lnRef>
+          <a:fillRef idx="0">
+            <a:schemeClr val="accent1"/>
+          </a:fillRef>
+          <a:effectRef idx="1">
+            <a:schemeClr val="accent1"/>
+          </a:effectRef>
+          <a:fontRef idx="minor">
+            <a:schemeClr val="tx1"/>
+          </a:fontRef>
+        </p:style>
+      </p:cxnSp>
+      <p:cxnSp>
+        <p:nvCxnSpPr>
+          <p:cNvPr id="75" name="Straight Arrow Connector 74"/>
+          <p:cNvCxnSpPr>
+            <a:stCxn id="54" idx="4"/>
+            <a:endCxn id="60" idx="0"/>
+          </p:cNvCxnSpPr>
+          <p:nvPr/>
+        </p:nvCxnSpPr>
+        <p:spPr>
+          <a:xfrm>
+            <a:off x="5183539" y="3663338"/>
+            <a:ext cx="0" cy="593717"/>
+          </a:xfrm>
+          <a:prstGeom prst="straightConnector1">
+            <a:avLst/>
+          </a:prstGeom>
+          <a:ln w="88900">
+            <a:solidFill>
+              <a:schemeClr val="tx1"/>
+            </a:solidFill>
+            <a:tailEnd type="triangle" w="med" len="med"/>
+          </a:ln>
+          <a:effectLst/>
+        </p:spPr>
+        <p:style>
+          <a:lnRef idx="2">
+            <a:schemeClr val="accent1"/>
+          </a:lnRef>
+          <a:fillRef idx="0">
+            <a:schemeClr val="accent1"/>
+          </a:fillRef>
+          <a:effectRef idx="1">
+            <a:schemeClr val="accent1"/>
+          </a:effectRef>
+          <a:fontRef idx="minor">
+            <a:schemeClr val="tx1"/>
+          </a:fontRef>
+        </p:style>
+      </p:cxnSp>
+      <p:cxnSp>
+        <p:nvCxnSpPr>
+          <p:cNvPr id="78" name="Straight Arrow Connector 77"/>
+          <p:cNvCxnSpPr>
+            <a:stCxn id="51" idx="3"/>
+            <a:endCxn id="60" idx="7"/>
+          </p:cNvCxnSpPr>
+          <p:nvPr/>
+        </p:nvCxnSpPr>
+        <p:spPr>
+          <a:xfrm flipH="1">
+            <a:off x="5654401" y="3483681"/>
+            <a:ext cx="1334875" cy="953031"/>
+          </a:xfrm>
+          <a:prstGeom prst="straightConnector1">
+            <a:avLst/>
+          </a:prstGeom>
+          <a:ln w="88900">
+            <a:solidFill>
+              <a:schemeClr val="tx1"/>
+            </a:solidFill>
+            <a:tailEnd type="triangle" w="med" len="med"/>
+          </a:ln>
+          <a:effectLst/>
+        </p:spPr>
+        <p:style>
+          <a:lnRef idx="2">
+            <a:schemeClr val="accent1"/>
+          </a:lnRef>
+          <a:fillRef idx="0">
+            <a:schemeClr val="accent1"/>
+          </a:fillRef>
+          <a:effectRef idx="1">
+            <a:schemeClr val="accent1"/>
+          </a:effectRef>
+          <a:fontRef idx="minor">
+            <a:schemeClr val="tx1"/>
+          </a:fontRef>
+        </p:style>
+      </p:cxnSp>
+      <p:cxnSp>
+        <p:nvCxnSpPr>
+          <p:cNvPr id="81" name="Straight Arrow Connector 80"/>
+          <p:cNvCxnSpPr>
+            <a:stCxn id="40" idx="4"/>
+            <a:endCxn id="54" idx="0"/>
+          </p:cNvCxnSpPr>
+          <p:nvPr/>
+        </p:nvCxnSpPr>
+        <p:spPr>
+          <a:xfrm>
+            <a:off x="5183539" y="1738345"/>
+            <a:ext cx="0" cy="698220"/>
+          </a:xfrm>
+          <a:prstGeom prst="straightConnector1">
+            <a:avLst/>
+          </a:prstGeom>
+          <a:ln w="88900">
+            <a:solidFill>
+              <a:schemeClr val="tx1"/>
+            </a:solidFill>
+            <a:tailEnd type="triangle" w="med" len="med"/>
+          </a:ln>
+          <a:effectLst/>
+        </p:spPr>
+        <p:style>
+          <a:lnRef idx="2">
+            <a:schemeClr val="accent1"/>
+          </a:lnRef>
+          <a:fillRef idx="0">
+            <a:schemeClr val="accent1"/>
+          </a:fillRef>
+          <a:effectRef idx="1">
+            <a:schemeClr val="accent1"/>
+          </a:effectRef>
+          <a:fontRef idx="minor">
+            <a:schemeClr val="tx1"/>
+          </a:fontRef>
+        </p:style>
+      </p:cxnSp>
       <p:pic>
         <p:nvPicPr>
-          <p:cNvPr id="8" name="Picture 7"/>
+          <p:cNvPr id="84" name="Picture 83"/>
           <p:cNvPicPr>
             <a:picLocks noChangeAspect="1"/>
           </p:cNvPicPr>
@@ -6479,32 +7452,8 @@
         </p:blipFill>
         <p:spPr>
           <a:xfrm>
-            <a:off x="4741178" y="4500593"/>
-            <a:ext cx="1356655" cy="469900"/>
-          </a:xfrm>
-          <a:prstGeom prst="rect">
-            <a:avLst/>
-          </a:prstGeom>
-        </p:spPr>
-      </p:pic>
-      <p:pic>
-        <p:nvPicPr>
-          <p:cNvPr id="9" name="Picture 8"/>
-          <p:cNvPicPr>
-            <a:picLocks noChangeAspect="1"/>
-          </p:cNvPicPr>
-          <p:nvPr/>
-        </p:nvPicPr>
-        <p:blipFill>
-          <a:blip r:embed="rId3"/>
-          <a:stretch>
-            <a:fillRect/>
-          </a:stretch>
-        </p:blipFill>
-        <p:spPr>
-          <a:xfrm>
-            <a:off x="5180451" y="2048783"/>
-            <a:ext cx="440097" cy="691581"/>
+            <a:off x="4957712" y="4989103"/>
+            <a:ext cx="428293" cy="301752"/>
           </a:xfrm>
           <a:prstGeom prst="rect">
             <a:avLst/>
@@ -6514,13 +7463,20 @@
     </p:spTree>
     <p:extLst>
       <p:ext uri="{BB962C8B-B14F-4D97-AF65-F5344CB8AC3E}">
-        <p14:creationId xmlns:p14="http://schemas.microsoft.com/office/powerpoint/2010/main" val="2445036075"/>
+        <p14:creationId xmlns:p14="http://schemas.microsoft.com/office/powerpoint/2010/main" val="448184361"/>
       </p:ext>
     </p:extLst>
   </p:cSld>
   <p:clrMapOvr>
     <a:masterClrMapping/>
   </p:clrMapOvr>
+  <p:timing>
+    <p:tnLst>
+      <p:par>
+        <p:cTn xmlns:p14="http://schemas.microsoft.com/office/powerpoint/2010/main" id="1" dur="indefinite" restart="never" nodeType="tmRoot"/>
+      </p:par>
+    </p:tnLst>
+  </p:timing>
 </p:sld>
 </file>
 

</xml_diff>